<commit_message>
added a new slide into "S3_inter_bucket_copy.pptx".
</commit_message>
<xml_diff>
--- a/explain_S3_inter_bucket_copy/S3_inter_bucket_copy.pptx
+++ b/explain_S3_inter_bucket_copy/S3_inter_bucket_copy.pptx
@@ -10,6 +10,7 @@
     <p:sldId id="263" r:id="rId4"/>
     <p:sldId id="262" r:id="rId5"/>
     <p:sldId id="264" r:id="rId6"/>
+    <p:sldId id="265" r:id="rId7"/>
   </p:sldIdLst>
   <p:sldSz cx="9144000" cy="6858000" type="screen4x3"/>
   <p:notesSz cx="6858000" cy="9144000"/>
@@ -293,7 +294,7 @@
             <a:fld id="{E90ED720-0104-4369-84BC-D37694168613}" type="datetimeFigureOut">
               <a:rPr kumimoji="1" lang="ja-JP" altLang="en-US" smtClean="0"/>
               <a:pPr/>
-              <a:t>2018/4/28</a:t>
+              <a:t>2018/4/29</a:t>
             </a:fld>
             <a:endParaRPr kumimoji="1" lang="ja-JP" altLang="en-US"/>
           </a:p>
@@ -492,7 +493,7 @@
             <a:fld id="{E90ED720-0104-4369-84BC-D37694168613}" type="datetimeFigureOut">
               <a:rPr kumimoji="1" lang="ja-JP" altLang="en-US" smtClean="0"/>
               <a:pPr/>
-              <a:t>2018/4/28</a:t>
+              <a:t>2018/4/29</a:t>
             </a:fld>
             <a:endParaRPr kumimoji="1" lang="ja-JP" altLang="en-US"/>
           </a:p>
@@ -701,7 +702,7 @@
             <a:fld id="{E90ED720-0104-4369-84BC-D37694168613}" type="datetimeFigureOut">
               <a:rPr kumimoji="1" lang="ja-JP" altLang="en-US" smtClean="0"/>
               <a:pPr/>
-              <a:t>2018/4/28</a:t>
+              <a:t>2018/4/29</a:t>
             </a:fld>
             <a:endParaRPr kumimoji="1" lang="ja-JP" altLang="en-US"/>
           </a:p>
@@ -900,7 +901,7 @@
             <a:fld id="{E90ED720-0104-4369-84BC-D37694168613}" type="datetimeFigureOut">
               <a:rPr kumimoji="1" lang="ja-JP" altLang="en-US" smtClean="0"/>
               <a:pPr/>
-              <a:t>2018/4/28</a:t>
+              <a:t>2018/4/29</a:t>
             </a:fld>
             <a:endParaRPr kumimoji="1" lang="ja-JP" altLang="en-US"/>
           </a:p>
@@ -1143,7 +1144,7 @@
             <a:fld id="{E90ED720-0104-4369-84BC-D37694168613}" type="datetimeFigureOut">
               <a:rPr kumimoji="1" lang="ja-JP" altLang="en-US" smtClean="0"/>
               <a:pPr/>
-              <a:t>2018/4/28</a:t>
+              <a:t>2018/4/29</a:t>
             </a:fld>
             <a:endParaRPr kumimoji="1" lang="ja-JP" altLang="en-US"/>
           </a:p>
@@ -1492,7 +1493,7 @@
             <a:fld id="{E90ED720-0104-4369-84BC-D37694168613}" type="datetimeFigureOut">
               <a:rPr kumimoji="1" lang="ja-JP" altLang="en-US" smtClean="0"/>
               <a:pPr/>
-              <a:t>2018/4/28</a:t>
+              <a:t>2018/4/29</a:t>
             </a:fld>
             <a:endParaRPr kumimoji="1" lang="ja-JP" altLang="en-US"/>
           </a:p>
@@ -1975,7 +1976,7 @@
             <a:fld id="{E90ED720-0104-4369-84BC-D37694168613}" type="datetimeFigureOut">
               <a:rPr kumimoji="1" lang="ja-JP" altLang="en-US" smtClean="0"/>
               <a:pPr/>
-              <a:t>2018/4/28</a:t>
+              <a:t>2018/4/29</a:t>
             </a:fld>
             <a:endParaRPr kumimoji="1" lang="ja-JP" altLang="en-US"/>
           </a:p>
@@ -2090,7 +2091,7 @@
             <a:fld id="{E90ED720-0104-4369-84BC-D37694168613}" type="datetimeFigureOut">
               <a:rPr kumimoji="1" lang="ja-JP" altLang="en-US" smtClean="0"/>
               <a:pPr/>
-              <a:t>2018/4/28</a:t>
+              <a:t>2018/4/29</a:t>
             </a:fld>
             <a:endParaRPr kumimoji="1" lang="ja-JP" altLang="en-US"/>
           </a:p>
@@ -2182,7 +2183,7 @@
             <a:fld id="{E90ED720-0104-4369-84BC-D37694168613}" type="datetimeFigureOut">
               <a:rPr kumimoji="1" lang="ja-JP" altLang="en-US" smtClean="0"/>
               <a:pPr/>
-              <a:t>2018/4/28</a:t>
+              <a:t>2018/4/29</a:t>
             </a:fld>
             <a:endParaRPr kumimoji="1" lang="ja-JP" altLang="en-US"/>
           </a:p>
@@ -2488,7 +2489,7 @@
             <a:fld id="{E90ED720-0104-4369-84BC-D37694168613}" type="datetimeFigureOut">
               <a:rPr kumimoji="1" lang="ja-JP" altLang="en-US" smtClean="0"/>
               <a:pPr/>
-              <a:t>2018/4/28</a:t>
+              <a:t>2018/4/29</a:t>
             </a:fld>
             <a:endParaRPr kumimoji="1" lang="ja-JP" altLang="en-US"/>
           </a:p>
@@ -2738,7 +2739,7 @@
             <a:fld id="{E90ED720-0104-4369-84BC-D37694168613}" type="datetimeFigureOut">
               <a:rPr kumimoji="1" lang="ja-JP" altLang="en-US" smtClean="0"/>
               <a:pPr/>
-              <a:t>2018/4/28</a:t>
+              <a:t>2018/4/29</a:t>
             </a:fld>
             <a:endParaRPr kumimoji="1" lang="ja-JP" altLang="en-US"/>
           </a:p>
@@ -2980,7 +2981,7 @@
             <a:fld id="{E90ED720-0104-4369-84BC-D37694168613}" type="datetimeFigureOut">
               <a:rPr kumimoji="1" lang="ja-JP" altLang="en-US" smtClean="0"/>
               <a:pPr/>
-              <a:t>2018/4/28</a:t>
+              <a:t>2018/4/29</a:t>
             </a:fld>
             <a:endParaRPr kumimoji="1" lang="ja-JP" altLang="en-US"/>
           </a:p>
@@ -3408,7 +3409,7 @@
             <a:blip r:embed="rId2" cstate="print">
               <a:extLst>
                 <a:ext uri="{28A0092B-C50C-407E-A947-70E740481C1C}">
-                  <a14:useLocalDpi xmlns:a14="http://schemas.microsoft.com/office/drawing/2010/main" xmlns="" val="0"/>
+                  <a14:useLocalDpi xmlns="" xmlns:a14="http://schemas.microsoft.com/office/drawing/2010/main" val="0"/>
                 </a:ext>
               </a:extLst>
             </a:blip>
@@ -3487,7 +3488,7 @@
             <a:blip r:embed="rId3" cstate="print">
               <a:extLst>
                 <a:ext uri="{28A0092B-C50C-407E-A947-70E740481C1C}">
-                  <a14:useLocalDpi xmlns:a14="http://schemas.microsoft.com/office/drawing/2010/main" xmlns="" val="0"/>
+                  <a14:useLocalDpi xmlns="" xmlns:a14="http://schemas.microsoft.com/office/drawing/2010/main" val="0"/>
                 </a:ext>
               </a:extLst>
             </a:blip>
@@ -3532,7 +3533,7 @@
             <a:blip r:embed="rId4" cstate="print">
               <a:extLst>
                 <a:ext uri="{28A0092B-C50C-407E-A947-70E740481C1C}">
-                  <a14:useLocalDpi xmlns:a14="http://schemas.microsoft.com/office/drawing/2010/main" xmlns="" val="0"/>
+                  <a14:useLocalDpi xmlns="" xmlns:a14="http://schemas.microsoft.com/office/drawing/2010/main" val="0"/>
                 </a:ext>
               </a:extLst>
             </a:blip>
@@ -3643,7 +3644,7 @@
             <a:blip r:embed="rId5" cstate="print">
               <a:extLst>
                 <a:ext uri="{28A0092B-C50C-407E-A947-70E740481C1C}">
-                  <a14:useLocalDpi xmlns:a14="http://schemas.microsoft.com/office/drawing/2010/main" xmlns="" val="0"/>
+                  <a14:useLocalDpi xmlns="" xmlns:a14="http://schemas.microsoft.com/office/drawing/2010/main" val="0"/>
                 </a:ext>
               </a:extLst>
             </a:blip>
@@ -3761,15 +3762,7 @@
                 <a:ea typeface="Verdana" pitchFamily="34" charset="0"/>
                 <a:cs typeface="Helvetica Neue"/>
               </a:rPr>
-              <a:t>AWS </a:t>
-            </a:r>
-            <a:r>
-              <a:rPr lang="en-US" sz="900" b="1" smtClean="0">
-                <a:latin typeface="+mj-lt"/>
-                <a:ea typeface="Verdana" pitchFamily="34" charset="0"/>
-                <a:cs typeface="Helvetica Neue"/>
-              </a:rPr>
-              <a:t>account</a:t>
+              <a:t>AWS account</a:t>
             </a:r>
             <a:endParaRPr lang="en-US" sz="900" b="1" dirty="0">
               <a:latin typeface="+mj-lt"/>
@@ -3791,7 +3784,7 @@
           <a:blip r:embed="rId6" cstate="print">
             <a:extLst>
               <a:ext uri="{28A0092B-C50C-407E-A947-70E740481C1C}">
-                <a14:useLocalDpi xmlns:a14="http://schemas.microsoft.com/office/drawing/2010/main" xmlns="" val="0"/>
+                <a14:useLocalDpi xmlns="" xmlns:a14="http://schemas.microsoft.com/office/drawing/2010/main" val="0"/>
               </a:ext>
             </a:extLst>
           </a:blip>
@@ -3835,7 +3828,7 @@
             <a:blip r:embed="rId7" cstate="print">
               <a:extLst>
                 <a:ext uri="{28A0092B-C50C-407E-A947-70E740481C1C}">
-                  <a14:useLocalDpi xmlns:a14="http://schemas.microsoft.com/office/drawing/2010/main" xmlns="" val="0"/>
+                  <a14:useLocalDpi xmlns="" xmlns:a14="http://schemas.microsoft.com/office/drawing/2010/main" val="0"/>
                 </a:ext>
               </a:extLst>
             </a:blip>
@@ -3897,8 +3890,8 @@
         </p:nvSpPr>
         <p:spPr>
           <a:xfrm>
-            <a:off x="395536" y="4293097"/>
-            <a:ext cx="576064" cy="144016"/>
+            <a:off x="467544" y="4293096"/>
+            <a:ext cx="432048" cy="144015"/>
           </a:xfrm>
           <a:prstGeom prst="rect">
             <a:avLst/>
@@ -3932,7 +3925,7 @@
           <a:blip r:embed="rId8" cstate="print">
             <a:extLst>
               <a:ext uri="{28A0092B-C50C-407E-A947-70E740481C1C}">
-                <a14:useLocalDpi xmlns:a14="http://schemas.microsoft.com/office/drawing/2010/main" xmlns="" val="0"/>
+                <a14:useLocalDpi xmlns="" xmlns:a14="http://schemas.microsoft.com/office/drawing/2010/main" val="0"/>
               </a:ext>
             </a:extLst>
           </a:blip>
@@ -3942,8 +3935,8 @@
         </p:blipFill>
         <p:spPr>
           <a:xfrm>
-            <a:off x="535342" y="3966669"/>
-            <a:ext cx="314769" cy="326428"/>
+            <a:off x="535343" y="3966669"/>
+            <a:ext cx="292242" cy="303067"/>
           </a:xfrm>
           <a:prstGeom prst="rect">
             <a:avLst/>
@@ -3997,7 +3990,7 @@
           <a:blip r:embed="rId9" cstate="print">
             <a:extLst>
               <a:ext uri="{28A0092B-C50C-407E-A947-70E740481C1C}">
-                <a14:useLocalDpi xmlns:a14="http://schemas.microsoft.com/office/drawing/2010/main" xmlns="" val="0"/>
+                <a14:useLocalDpi xmlns="" xmlns:a14="http://schemas.microsoft.com/office/drawing/2010/main" val="0"/>
               </a:ext>
             </a:extLst>
           </a:blip>
@@ -4027,7 +4020,7 @@
           <a:blip r:embed="rId10" cstate="print">
             <a:extLst>
               <a:ext uri="{28A0092B-C50C-407E-A947-70E740481C1C}">
-                <a14:useLocalDpi xmlns:a14="http://schemas.microsoft.com/office/drawing/2010/main" xmlns="" val="0"/>
+                <a14:useLocalDpi xmlns="" xmlns:a14="http://schemas.microsoft.com/office/drawing/2010/main" val="0"/>
               </a:ext>
             </a:extLst>
           </a:blip>
@@ -4092,7 +4085,7 @@
           <a:blip r:embed="rId11" cstate="print">
             <a:extLst>
               <a:ext uri="{28A0092B-C50C-407E-A947-70E740481C1C}">
-                <a14:useLocalDpi xmlns:a14="http://schemas.microsoft.com/office/drawing/2010/main" xmlns="" val="0"/>
+                <a14:useLocalDpi xmlns="" xmlns:a14="http://schemas.microsoft.com/office/drawing/2010/main" val="0"/>
               </a:ext>
             </a:extLst>
           </a:blip>
@@ -4297,15 +4290,7 @@
                 <a:ea typeface="Verdana" pitchFamily="34" charset="0"/>
                 <a:cs typeface="Helvetica Neue"/>
               </a:rPr>
-              <a:t>AWS </a:t>
-            </a:r>
-            <a:r>
-              <a:rPr lang="en-US" sz="900" b="1" smtClean="0">
-                <a:latin typeface="+mj-lt"/>
-                <a:ea typeface="Verdana" pitchFamily="34" charset="0"/>
-                <a:cs typeface="Helvetica Neue"/>
-              </a:rPr>
-              <a:t>account</a:t>
+              <a:t>AWS account</a:t>
             </a:r>
             <a:endParaRPr lang="en-US" sz="900" b="1" dirty="0">
               <a:latin typeface="+mj-lt"/>
@@ -4327,7 +4312,7 @@
           <a:blip r:embed="rId2" cstate="print">
             <a:extLst>
               <a:ext uri="{28A0092B-C50C-407E-A947-70E740481C1C}">
-                <a14:useLocalDpi xmlns:a14="http://schemas.microsoft.com/office/drawing/2010/main" xmlns="" val="0"/>
+                <a14:useLocalDpi xmlns="" xmlns:a14="http://schemas.microsoft.com/office/drawing/2010/main" val="0"/>
               </a:ext>
             </a:extLst>
           </a:blip>
@@ -4393,7 +4378,6 @@
                 <a:rPr lang="en-US" sz="800" b="1" smtClean="0"/>
                 <a:t>Source</a:t>
               </a:r>
-              <a:endParaRPr lang="en-US" sz="800" b="1" smtClean="0"/>
             </a:p>
             <a:p>
               <a:pPr algn="ctr"/>
@@ -4413,7 +4397,7 @@
             <a:blip r:embed="rId3" cstate="print">
               <a:extLst>
                 <a:ext uri="{28A0092B-C50C-407E-A947-70E740481C1C}">
-                  <a14:useLocalDpi xmlns:a14="http://schemas.microsoft.com/office/drawing/2010/main" xmlns="" val="0"/>
+                  <a14:useLocalDpi xmlns="" xmlns:a14="http://schemas.microsoft.com/office/drawing/2010/main" val="0"/>
                 </a:ext>
               </a:extLst>
             </a:blip>
@@ -4480,7 +4464,6 @@
                 <a:rPr lang="en-US" sz="800" b="1" smtClean="0"/>
                 <a:t>Destination</a:t>
               </a:r>
-              <a:endParaRPr lang="en-US" sz="800" b="1" smtClean="0"/>
             </a:p>
             <a:p>
               <a:pPr algn="ctr"/>
@@ -4500,7 +4483,7 @@
             <a:blip r:embed="rId3" cstate="print">
               <a:extLst>
                 <a:ext uri="{28A0092B-C50C-407E-A947-70E740481C1C}">
-                  <a14:useLocalDpi xmlns:a14="http://schemas.microsoft.com/office/drawing/2010/main" xmlns="" val="0"/>
+                  <a14:useLocalDpi xmlns="" xmlns:a14="http://schemas.microsoft.com/office/drawing/2010/main" val="0"/>
                 </a:ext>
               </a:extLst>
             </a:blip>
@@ -4531,7 +4514,7 @@
           <a:blip r:embed="rId4" cstate="print">
             <a:extLst>
               <a:ext uri="{28A0092B-C50C-407E-A947-70E740481C1C}">
-                <a14:useLocalDpi xmlns:a14="http://schemas.microsoft.com/office/drawing/2010/main" xmlns="" val="0"/>
+                <a14:useLocalDpi xmlns="" xmlns:a14="http://schemas.microsoft.com/office/drawing/2010/main" val="0"/>
               </a:ext>
             </a:extLst>
           </a:blip>
@@ -4631,7 +4614,7 @@
           <a:blip r:embed="rId5" cstate="print">
             <a:extLst>
               <a:ext uri="{28A0092B-C50C-407E-A947-70E740481C1C}">
-                <a14:useLocalDpi xmlns:a14="http://schemas.microsoft.com/office/drawing/2010/main" xmlns="" val="0"/>
+                <a14:useLocalDpi xmlns="" xmlns:a14="http://schemas.microsoft.com/office/drawing/2010/main" val="0"/>
               </a:ext>
             </a:extLst>
           </a:blip>
@@ -4903,7 +4886,7 @@
             <a:blip r:embed="rId6" cstate="print">
               <a:extLst>
                 <a:ext uri="{28A0092B-C50C-407E-A947-70E740481C1C}">
-                  <a14:useLocalDpi xmlns:a14="http://schemas.microsoft.com/office/drawing/2010/main" xmlns="" val="0"/>
+                  <a14:useLocalDpi xmlns="" xmlns:a14="http://schemas.microsoft.com/office/drawing/2010/main" val="0"/>
                 </a:ext>
               </a:extLst>
             </a:blip>
@@ -5236,15 +5219,7 @@
                 <a:ea typeface="Verdana" pitchFamily="34" charset="0"/>
                 <a:cs typeface="Helvetica Neue"/>
               </a:rPr>
-              <a:t>AWS </a:t>
-            </a:r>
-            <a:r>
-              <a:rPr lang="en-US" sz="900" b="1" smtClean="0">
-                <a:latin typeface="+mj-lt"/>
-                <a:ea typeface="Verdana" pitchFamily="34" charset="0"/>
-                <a:cs typeface="Helvetica Neue"/>
-              </a:rPr>
-              <a:t>account</a:t>
+              <a:t>AWS account</a:t>
             </a:r>
           </a:p>
           <a:p>
@@ -5277,7 +5252,7 @@
           <a:blip r:embed="rId2" cstate="print">
             <a:extLst>
               <a:ext uri="{28A0092B-C50C-407E-A947-70E740481C1C}">
-                <a14:useLocalDpi xmlns:a14="http://schemas.microsoft.com/office/drawing/2010/main" xmlns="" val="0"/>
+                <a14:useLocalDpi xmlns="" xmlns:a14="http://schemas.microsoft.com/office/drawing/2010/main" val="0"/>
               </a:ext>
             </a:extLst>
           </a:blip>
@@ -5307,7 +5282,7 @@
           <a:blip r:embed="rId3" cstate="print">
             <a:extLst>
               <a:ext uri="{28A0092B-C50C-407E-A947-70E740481C1C}">
-                <a14:useLocalDpi xmlns:a14="http://schemas.microsoft.com/office/drawing/2010/main" xmlns="" val="0"/>
+                <a14:useLocalDpi xmlns="" xmlns:a14="http://schemas.microsoft.com/office/drawing/2010/main" val="0"/>
               </a:ext>
             </a:extLst>
           </a:blip>
@@ -5372,7 +5347,7 @@
           <a:blip r:embed="rId4" cstate="print">
             <a:extLst>
               <a:ext uri="{28A0092B-C50C-407E-A947-70E740481C1C}">
-                <a14:useLocalDpi xmlns:a14="http://schemas.microsoft.com/office/drawing/2010/main" xmlns="" val="0"/>
+                <a14:useLocalDpi xmlns="" xmlns:a14="http://schemas.microsoft.com/office/drawing/2010/main" val="0"/>
               </a:ext>
             </a:extLst>
           </a:blip>
@@ -5568,7 +5543,7 @@
             <a:blip r:embed="rId5" cstate="print">
               <a:extLst>
                 <a:ext uri="{28A0092B-C50C-407E-A947-70E740481C1C}">
-                  <a14:useLocalDpi xmlns:a14="http://schemas.microsoft.com/office/drawing/2010/main" xmlns="" val="0"/>
+                  <a14:useLocalDpi xmlns="" xmlns:a14="http://schemas.microsoft.com/office/drawing/2010/main" val="0"/>
                 </a:ext>
               </a:extLst>
             </a:blip>
@@ -5809,15 +5784,7 @@
                 <a:ea typeface="Verdana" pitchFamily="34" charset="0"/>
                 <a:cs typeface="Helvetica Neue"/>
               </a:rPr>
-              <a:t>AWS </a:t>
-            </a:r>
-            <a:r>
-              <a:rPr lang="en-US" sz="900" b="1" smtClean="0">
-                <a:latin typeface="+mj-lt"/>
-                <a:ea typeface="Verdana" pitchFamily="34" charset="0"/>
-                <a:cs typeface="Helvetica Neue"/>
-              </a:rPr>
-              <a:t>account</a:t>
+              <a:t>AWS account</a:t>
             </a:r>
           </a:p>
           <a:p>
@@ -5850,7 +5817,7 @@
           <a:blip r:embed="rId2" cstate="print">
             <a:extLst>
               <a:ext uri="{28A0092B-C50C-407E-A947-70E740481C1C}">
-                <a14:useLocalDpi xmlns:a14="http://schemas.microsoft.com/office/drawing/2010/main" xmlns="" val="0"/>
+                <a14:useLocalDpi xmlns="" xmlns:a14="http://schemas.microsoft.com/office/drawing/2010/main" val="0"/>
               </a:ext>
             </a:extLst>
           </a:blip>
@@ -5959,7 +5926,7 @@
           <a:blip r:embed="rId4" cstate="print">
             <a:extLst>
               <a:ext uri="{28A0092B-C50C-407E-A947-70E740481C1C}">
-                <a14:useLocalDpi xmlns:a14="http://schemas.microsoft.com/office/drawing/2010/main" xmlns="" val="0"/>
+                <a14:useLocalDpi xmlns="" xmlns:a14="http://schemas.microsoft.com/office/drawing/2010/main" val="0"/>
               </a:ext>
             </a:extLst>
           </a:blip>
@@ -6022,7 +5989,7 @@
           <a:blip r:embed="rId6" cstate="print">
             <a:extLst>
               <a:ext uri="{28A0092B-C50C-407E-A947-70E740481C1C}">
-                <a14:useLocalDpi xmlns:a14="http://schemas.microsoft.com/office/drawing/2010/main" xmlns="" val="0"/>
+                <a14:useLocalDpi xmlns="" xmlns:a14="http://schemas.microsoft.com/office/drawing/2010/main" val="0"/>
               </a:ext>
             </a:extLst>
           </a:blip>
@@ -6219,7 +6186,7 @@
             <a:blip r:embed="rId7" cstate="print">
               <a:extLst>
                 <a:ext uri="{28A0092B-C50C-407E-A947-70E740481C1C}">
-                  <a14:useLocalDpi xmlns:a14="http://schemas.microsoft.com/office/drawing/2010/main" xmlns="" val="0"/>
+                  <a14:useLocalDpi xmlns="" xmlns:a14="http://schemas.microsoft.com/office/drawing/2010/main" val="0"/>
                 </a:ext>
               </a:extLst>
             </a:blip>
@@ -6303,7 +6270,7 @@
             <a:blip r:embed="rId8" cstate="print">
               <a:extLst>
                 <a:ext uri="{28A0092B-C50C-407E-A947-70E740481C1C}">
-                  <a14:useLocalDpi xmlns:a14="http://schemas.microsoft.com/office/drawing/2010/main" xmlns="" val="0"/>
+                  <a14:useLocalDpi xmlns="" xmlns:a14="http://schemas.microsoft.com/office/drawing/2010/main" val="0"/>
                 </a:ext>
               </a:extLst>
             </a:blip>
@@ -6464,11 +6431,7 @@
             </a:r>
             <a:r>
               <a:rPr lang="en-US" altLang="ja-JP" sz="1000" smtClean="0"/>
-              <a:t>on </a:t>
-            </a:r>
-            <a:r>
-              <a:rPr lang="en-US" altLang="ja-JP" sz="1000" smtClean="0"/>
-              <a:t>"inter-bucket-copy-src"</a:t>
+              <a:t>on "inter-bucket-copy-src"</a:t>
             </a:r>
           </a:p>
           <a:p>
@@ -6627,7 +6590,6 @@
               <a:rPr lang="en-US" sz="800" b="1" smtClean="0"/>
               <a:t>inter-bucket-copy-src</a:t>
             </a:r>
-            <a:endParaRPr lang="en-US" sz="800" b="1" smtClean="0"/>
           </a:p>
           <a:p>
             <a:pPr algn="ctr"/>
@@ -6647,7 +6609,7 @@
           <a:blip r:embed="rId9" cstate="print">
             <a:extLst>
               <a:ext uri="{28A0092B-C50C-407E-A947-70E740481C1C}">
-                <a14:useLocalDpi xmlns:a14="http://schemas.microsoft.com/office/drawing/2010/main" xmlns="" val="0"/>
+                <a14:useLocalDpi xmlns="" xmlns:a14="http://schemas.microsoft.com/office/drawing/2010/main" val="0"/>
               </a:ext>
             </a:extLst>
           </a:blip>
@@ -6699,7 +6661,6 @@
               <a:rPr lang="en-US" sz="800" b="1" smtClean="0"/>
               <a:t>inter-bucket-copy-dst</a:t>
             </a:r>
-            <a:endParaRPr lang="en-US" sz="800" b="1" smtClean="0"/>
           </a:p>
           <a:p>
             <a:pPr algn="ctr"/>
@@ -6719,7 +6680,7 @@
           <a:blip r:embed="rId9" cstate="print">
             <a:extLst>
               <a:ext uri="{28A0092B-C50C-407E-A947-70E740481C1C}">
-                <a14:useLocalDpi xmlns:a14="http://schemas.microsoft.com/office/drawing/2010/main" xmlns="" val="0"/>
+                <a14:useLocalDpi xmlns="" xmlns:a14="http://schemas.microsoft.com/office/drawing/2010/main" val="0"/>
               </a:ext>
             </a:extLst>
           </a:blip>
@@ -6828,15 +6789,7 @@
           <a:p>
             <a:r>
               <a:rPr lang="en-US" altLang="ja-JP" sz="2800" smtClean="0"/>
-              <a:t>The best way </a:t>
-            </a:r>
-            <a:r>
-              <a:rPr lang="en-US" altLang="ja-JP" sz="2800" smtClean="0"/>
-              <a:t>we </a:t>
-            </a:r>
-            <a:r>
-              <a:rPr lang="en-US" altLang="ja-JP" sz="2800" smtClean="0"/>
-              <a:t>have achieved.</a:t>
+              <a:t>The best way we have achieved.</a:t>
             </a:r>
             <a:br>
               <a:rPr lang="en-US" altLang="ja-JP" sz="2800" smtClean="0"/>
@@ -6948,15 +6901,7 @@
                 <a:ea typeface="Verdana" pitchFamily="34" charset="0"/>
                 <a:cs typeface="Helvetica Neue"/>
               </a:rPr>
-              <a:t>AWS </a:t>
-            </a:r>
-            <a:r>
-              <a:rPr lang="en-US" sz="900" b="1" smtClean="0">
-                <a:latin typeface="+mj-lt"/>
-                <a:ea typeface="Verdana" pitchFamily="34" charset="0"/>
-                <a:cs typeface="Helvetica Neue"/>
-              </a:rPr>
-              <a:t>account</a:t>
+              <a:t>AWS account</a:t>
             </a:r>
           </a:p>
           <a:p>
@@ -6989,7 +6934,7 @@
           <a:blip r:embed="rId2" cstate="print">
             <a:extLst>
               <a:ext uri="{28A0092B-C50C-407E-A947-70E740481C1C}">
-                <a14:useLocalDpi xmlns:a14="http://schemas.microsoft.com/office/drawing/2010/main" xmlns="" val="0"/>
+                <a14:useLocalDpi xmlns="" xmlns:a14="http://schemas.microsoft.com/office/drawing/2010/main" val="0"/>
               </a:ext>
             </a:extLst>
           </a:blip>
@@ -7019,7 +6964,7 @@
           <a:blip r:embed="rId3" cstate="print">
             <a:extLst>
               <a:ext uri="{28A0092B-C50C-407E-A947-70E740481C1C}">
-                <a14:useLocalDpi xmlns:a14="http://schemas.microsoft.com/office/drawing/2010/main" xmlns="" val="0"/>
+                <a14:useLocalDpi xmlns="" xmlns:a14="http://schemas.microsoft.com/office/drawing/2010/main" val="0"/>
               </a:ext>
             </a:extLst>
           </a:blip>
@@ -7084,7 +7029,7 @@
           <a:blip r:embed="rId4" cstate="print">
             <a:extLst>
               <a:ext uri="{28A0092B-C50C-407E-A947-70E740481C1C}">
-                <a14:useLocalDpi xmlns:a14="http://schemas.microsoft.com/office/drawing/2010/main" xmlns="" val="0"/>
+                <a14:useLocalDpi xmlns="" xmlns:a14="http://schemas.microsoft.com/office/drawing/2010/main" val="0"/>
               </a:ext>
             </a:extLst>
           </a:blip>
@@ -7280,7 +7225,7 @@
             <a:blip r:embed="rId5" cstate="print">
               <a:extLst>
                 <a:ext uri="{28A0092B-C50C-407E-A947-70E740481C1C}">
-                  <a14:useLocalDpi xmlns:a14="http://schemas.microsoft.com/office/drawing/2010/main" xmlns="" val="0"/>
+                  <a14:useLocalDpi xmlns="" xmlns:a14="http://schemas.microsoft.com/office/drawing/2010/main" val="0"/>
                 </a:ext>
               </a:extLst>
             </a:blip>
@@ -7477,15 +7422,7 @@
                 <a:ea typeface="Verdana" pitchFamily="34" charset="0"/>
                 <a:cs typeface="Helvetica Neue"/>
               </a:rPr>
-              <a:t>AWS </a:t>
-            </a:r>
-            <a:r>
-              <a:rPr lang="en-US" sz="900" b="1" smtClean="0">
-                <a:latin typeface="+mj-lt"/>
-                <a:ea typeface="Verdana" pitchFamily="34" charset="0"/>
-                <a:cs typeface="Helvetica Neue"/>
-              </a:rPr>
-              <a:t>account</a:t>
+              <a:t>AWS account</a:t>
             </a:r>
           </a:p>
           <a:p>
@@ -7518,7 +7455,7 @@
           <a:blip r:embed="rId2" cstate="print">
             <a:extLst>
               <a:ext uri="{28A0092B-C50C-407E-A947-70E740481C1C}">
-                <a14:useLocalDpi xmlns:a14="http://schemas.microsoft.com/office/drawing/2010/main" xmlns="" val="0"/>
+                <a14:useLocalDpi xmlns="" xmlns:a14="http://schemas.microsoft.com/office/drawing/2010/main" val="0"/>
               </a:ext>
             </a:extLst>
           </a:blip>
@@ -7644,11 +7581,7 @@
             </a:r>
             <a:r>
               <a:rPr lang="en-US" altLang="ja-JP" sz="1000" smtClean="0"/>
-              <a:t>on </a:t>
-            </a:r>
-            <a:r>
-              <a:rPr lang="en-US" altLang="ja-JP" sz="1000" smtClean="0"/>
-              <a:t>inter-bucket-copy-src</a:t>
+              <a:t>on inter-bucket-copy-src</a:t>
             </a:r>
           </a:p>
           <a:p>
@@ -7662,29 +7595,8 @@
                   <a:srgbClr val="FF0000"/>
                 </a:solidFill>
               </a:rPr>
-              <a:t>PutObject on </a:t>
-            </a:r>
-            <a:r>
-              <a:rPr lang="en-US" altLang="ja-JP" sz="1000" b="1" smtClean="0">
-                <a:solidFill>
-                  <a:srgbClr val="FF0000"/>
-                </a:solidFill>
-              </a:rPr>
-              <a:t>the </a:t>
-            </a:r>
-            <a:r>
-              <a:rPr lang="en-US" altLang="ja-JP" sz="1000" b="1" smtClean="0">
-                <a:solidFill>
-                  <a:srgbClr val="FF0000"/>
-                </a:solidFill>
-              </a:rPr>
-              <a:t>"inter-bucket-copy-dst"</a:t>
-            </a:r>
-            <a:endParaRPr lang="en-US" altLang="ja-JP" sz="1000" b="1" smtClean="0">
-              <a:solidFill>
-                <a:srgbClr val="FF0000"/>
-              </a:solidFill>
-            </a:endParaRPr>
+              <a:t>PutObject on the "inter-bucket-copy-dst"</a:t>
+            </a:r>
           </a:p>
         </p:txBody>
       </p:sp>
@@ -7781,7 +7693,6 @@
               <a:rPr lang="en-US" sz="800" b="1" smtClean="0"/>
               <a:t>inter-bucket-copy-src</a:t>
             </a:r>
-            <a:endParaRPr lang="en-US" sz="800" b="1" smtClean="0"/>
           </a:p>
           <a:p>
             <a:pPr algn="ctr"/>
@@ -7801,7 +7712,7 @@
           <a:blip r:embed="rId6" cstate="print">
             <a:extLst>
               <a:ext uri="{28A0092B-C50C-407E-A947-70E740481C1C}">
-                <a14:useLocalDpi xmlns:a14="http://schemas.microsoft.com/office/drawing/2010/main" xmlns="" val="0"/>
+                <a14:useLocalDpi xmlns="" xmlns:a14="http://schemas.microsoft.com/office/drawing/2010/main" val="0"/>
               </a:ext>
             </a:extLst>
           </a:blip>
@@ -7831,7 +7742,7 @@
           <a:blip r:embed="rId6" cstate="print">
             <a:extLst>
               <a:ext uri="{28A0092B-C50C-407E-A947-70E740481C1C}">
-                <a14:useLocalDpi xmlns:a14="http://schemas.microsoft.com/office/drawing/2010/main" xmlns="" val="0"/>
+                <a14:useLocalDpi xmlns="" xmlns:a14="http://schemas.microsoft.com/office/drawing/2010/main" val="0"/>
               </a:ext>
             </a:extLst>
           </a:blip>
@@ -7892,7 +7803,7 @@
           <a:blip r:embed="rId4" cstate="print">
             <a:extLst>
               <a:ext uri="{28A0092B-C50C-407E-A947-70E740481C1C}">
-                <a14:useLocalDpi xmlns:a14="http://schemas.microsoft.com/office/drawing/2010/main" xmlns="" val="0"/>
+                <a14:useLocalDpi xmlns="" xmlns:a14="http://schemas.microsoft.com/office/drawing/2010/main" val="0"/>
               </a:ext>
             </a:extLst>
           </a:blip>
@@ -7977,7 +7888,6 @@
               <a:rPr lang="en-US" sz="800" b="1" smtClean="0"/>
               <a:t>inter-bucket-copy-dst</a:t>
             </a:r>
-            <a:endParaRPr lang="en-US" sz="800" b="1" smtClean="0"/>
           </a:p>
           <a:p>
             <a:pPr algn="ctr"/>
@@ -8112,46 +8022,14 @@
           <a:p>
             <a:r>
               <a:rPr lang="en-US" altLang="ja-JP" sz="2400" smtClean="0"/>
-              <a:t>The best way </a:t>
-            </a:r>
-            <a:r>
-              <a:rPr lang="en-US" altLang="ja-JP" sz="2400" smtClean="0"/>
-              <a:t>we </a:t>
-            </a:r>
-            <a:r>
-              <a:rPr lang="en-US" altLang="ja-JP" sz="2400" smtClean="0"/>
-              <a:t>have achieved.</a:t>
-            </a:r>
-            <a:r>
-              <a:rPr lang="en-US" altLang="ja-JP" sz="2400" smtClean="0"/>
-              <a:t/>
+              <a:t>The best way we have achieved.</a:t>
             </a:r>
             <a:br>
               <a:rPr lang="en-US" altLang="ja-JP" sz="2400" smtClean="0"/>
             </a:br>
             <a:r>
               <a:rPr lang="en-US" altLang="ja-JP" sz="2400" smtClean="0"/>
-              <a:t>Type2: </a:t>
-            </a:r>
-            <a:r>
-              <a:rPr lang="en-US" altLang="ja-JP" sz="2400" smtClean="0"/>
-              <a:t>Add bucket policies to </a:t>
-            </a:r>
-            <a:r>
-              <a:rPr lang="en-US" altLang="ja-JP" sz="2400" smtClean="0"/>
-              <a:t>the </a:t>
-            </a:r>
-            <a:r>
-              <a:rPr lang="en-US" altLang="ja-JP" sz="2400" smtClean="0"/>
-              <a:t>source </a:t>
-            </a:r>
-            <a:r>
-              <a:rPr lang="en-US" altLang="ja-JP" sz="2400" smtClean="0"/>
-              <a:t>bucket</a:t>
-            </a:r>
-            <a:r>
-              <a:rPr lang="en-US" altLang="ja-JP" sz="2400" smtClean="0"/>
-              <a:t>.(More complex)</a:t>
+              <a:t>Type2: Add bucket policies to the source bucket.(More complex)</a:t>
             </a:r>
             <a:endParaRPr kumimoji="1" lang="ja-JP" altLang="en-US" sz="2400"/>
           </a:p>
@@ -8256,15 +8134,7 @@
                 <a:ea typeface="Verdana" pitchFamily="34" charset="0"/>
                 <a:cs typeface="Helvetica Neue"/>
               </a:rPr>
-              <a:t>AWS </a:t>
-            </a:r>
-            <a:r>
-              <a:rPr lang="en-US" sz="900" b="1" smtClean="0">
-                <a:latin typeface="+mj-lt"/>
-                <a:ea typeface="Verdana" pitchFamily="34" charset="0"/>
-                <a:cs typeface="Helvetica Neue"/>
-              </a:rPr>
-              <a:t>account</a:t>
+              <a:t>AWS account</a:t>
             </a:r>
           </a:p>
           <a:p>
@@ -8297,7 +8167,7 @@
           <a:blip r:embed="rId2" cstate="print">
             <a:extLst>
               <a:ext uri="{28A0092B-C50C-407E-A947-70E740481C1C}">
-                <a14:useLocalDpi xmlns:a14="http://schemas.microsoft.com/office/drawing/2010/main" xmlns="" val="0"/>
+                <a14:useLocalDpi xmlns="" xmlns:a14="http://schemas.microsoft.com/office/drawing/2010/main" val="0"/>
               </a:ext>
             </a:extLst>
           </a:blip>
@@ -8327,7 +8197,7 @@
           <a:blip r:embed="rId3" cstate="print">
             <a:extLst>
               <a:ext uri="{28A0092B-C50C-407E-A947-70E740481C1C}">
-                <a14:useLocalDpi xmlns:a14="http://schemas.microsoft.com/office/drawing/2010/main" xmlns="" val="0"/>
+                <a14:useLocalDpi xmlns="" xmlns:a14="http://schemas.microsoft.com/office/drawing/2010/main" val="0"/>
               </a:ext>
             </a:extLst>
           </a:blip>
@@ -8392,7 +8262,7 @@
           <a:blip r:embed="rId4" cstate="print">
             <a:extLst>
               <a:ext uri="{28A0092B-C50C-407E-A947-70E740481C1C}">
-                <a14:useLocalDpi xmlns:a14="http://schemas.microsoft.com/office/drawing/2010/main" xmlns="" val="0"/>
+                <a14:useLocalDpi xmlns="" xmlns:a14="http://schemas.microsoft.com/office/drawing/2010/main" val="0"/>
               </a:ext>
             </a:extLst>
           </a:blip>
@@ -8588,7 +8458,7 @@
             <a:blip r:embed="rId5" cstate="print">
               <a:extLst>
                 <a:ext uri="{28A0092B-C50C-407E-A947-70E740481C1C}">
-                  <a14:useLocalDpi xmlns:a14="http://schemas.microsoft.com/office/drawing/2010/main" xmlns="" val="0"/>
+                  <a14:useLocalDpi xmlns="" xmlns:a14="http://schemas.microsoft.com/office/drawing/2010/main" val="0"/>
                 </a:ext>
               </a:extLst>
             </a:blip>
@@ -8785,15 +8655,7 @@
                 <a:ea typeface="Verdana" pitchFamily="34" charset="0"/>
                 <a:cs typeface="Helvetica Neue"/>
               </a:rPr>
-              <a:t>AWS </a:t>
-            </a:r>
-            <a:r>
-              <a:rPr lang="en-US" sz="900" b="1" smtClean="0">
-                <a:latin typeface="+mj-lt"/>
-                <a:ea typeface="Verdana" pitchFamily="34" charset="0"/>
-                <a:cs typeface="Helvetica Neue"/>
-              </a:rPr>
-              <a:t>account</a:t>
+              <a:t>AWS account</a:t>
             </a:r>
           </a:p>
           <a:p>
@@ -8826,7 +8688,7 @@
           <a:blip r:embed="rId2" cstate="print">
             <a:extLst>
               <a:ext uri="{28A0092B-C50C-407E-A947-70E740481C1C}">
-                <a14:useLocalDpi xmlns:a14="http://schemas.microsoft.com/office/drawing/2010/main" xmlns="" val="0"/>
+                <a14:useLocalDpi xmlns="" xmlns:a14="http://schemas.microsoft.com/office/drawing/2010/main" val="0"/>
               </a:ext>
             </a:extLst>
           </a:blip>
@@ -8935,7 +8797,7 @@
           <a:blip r:embed="rId4" cstate="print">
             <a:extLst>
               <a:ext uri="{28A0092B-C50C-407E-A947-70E740481C1C}">
-                <a14:useLocalDpi xmlns:a14="http://schemas.microsoft.com/office/drawing/2010/main" xmlns="" val="0"/>
+                <a14:useLocalDpi xmlns="" xmlns:a14="http://schemas.microsoft.com/office/drawing/2010/main" val="0"/>
               </a:ext>
             </a:extLst>
           </a:blip>
@@ -8998,7 +8860,7 @@
           <a:blip r:embed="rId6" cstate="print">
             <a:extLst>
               <a:ext uri="{28A0092B-C50C-407E-A947-70E740481C1C}">
-                <a14:useLocalDpi xmlns:a14="http://schemas.microsoft.com/office/drawing/2010/main" xmlns="" val="0"/>
+                <a14:useLocalDpi xmlns="" xmlns:a14="http://schemas.microsoft.com/office/drawing/2010/main" val="0"/>
               </a:ext>
             </a:extLst>
           </a:blip>
@@ -9195,7 +9057,7 @@
             <a:blip r:embed="rId7" cstate="print">
               <a:extLst>
                 <a:ext uri="{28A0092B-C50C-407E-A947-70E740481C1C}">
-                  <a14:useLocalDpi xmlns:a14="http://schemas.microsoft.com/office/drawing/2010/main" xmlns="" val="0"/>
+                  <a14:useLocalDpi xmlns="" xmlns:a14="http://schemas.microsoft.com/office/drawing/2010/main" val="0"/>
                 </a:ext>
               </a:extLst>
             </a:blip>
@@ -9279,7 +9141,7 @@
             <a:blip r:embed="rId8" cstate="print">
               <a:extLst>
                 <a:ext uri="{28A0092B-C50C-407E-A947-70E740481C1C}">
-                  <a14:useLocalDpi xmlns:a14="http://schemas.microsoft.com/office/drawing/2010/main" xmlns="" val="0"/>
+                  <a14:useLocalDpi xmlns="" xmlns:a14="http://schemas.microsoft.com/office/drawing/2010/main" val="0"/>
                 </a:ext>
               </a:extLst>
             </a:blip>
@@ -9369,10 +9231,10 @@
               <a:t>2. </a:t>
             </a:r>
             <a:r>
-              <a:rPr kumimoji="1" lang="en-US" altLang="ja-JP" sz="1000" smtClean="0"/>
-              <a:t>The "src-user" can obtain a temporary credentials which has the dst-role's permissions.</a:t>
-            </a:r>
-            <a:endParaRPr kumimoji="1" lang="ja-JP" altLang="en-US" sz="1000"/>
+              <a:rPr lang="en-US" altLang="ja-JP" sz="1000" smtClean="0"/>
+              <a:t>You can obtain a set of  temporary credentials which has the dst-role's permissions.</a:t>
+            </a:r>
+            <a:endParaRPr lang="ja-JP" altLang="en-US" sz="1000"/>
           </a:p>
         </p:txBody>
       </p:sp>
@@ -9440,11 +9302,7 @@
             </a:r>
             <a:r>
               <a:rPr lang="en-US" altLang="ja-JP" sz="1000" strike="dblStrike" smtClean="0"/>
-              <a:t>on </a:t>
-            </a:r>
-            <a:r>
-              <a:rPr lang="en-US" altLang="ja-JP" sz="1000" strike="dblStrike" smtClean="0"/>
-              <a:t>"inter-bucket-copy-src"</a:t>
+              <a:t>on "inter-bucket-copy-src"</a:t>
             </a:r>
           </a:p>
           <a:p>
@@ -9454,17 +9312,8 @@
             </a:pPr>
             <a:r>
               <a:rPr lang="en-US" altLang="ja-JP" sz="1000" smtClean="0"/>
-              <a:t>AssumeRole to "</a:t>
-            </a:r>
-            <a:r>
-              <a:rPr lang="en-US" altLang="ja-JP" sz="1000" smtClean="0"/>
-              <a:t>dst-role</a:t>
-            </a:r>
-            <a:r>
-              <a:rPr lang="en-US" altLang="ja-JP" sz="1000" smtClean="0"/>
-              <a:t>"</a:t>
-            </a:r>
-            <a:endParaRPr lang="en-US" altLang="ja-JP" sz="1000" smtClean="0"/>
+              <a:t>AssumeRole to "dst-role"</a:t>
+            </a:r>
           </a:p>
         </p:txBody>
       </p:sp>
@@ -9522,64 +9371,22 @@
                   <a:srgbClr val="FF0000"/>
                 </a:solidFill>
               </a:rPr>
-              <a:t>ListBucket </a:t>
-            </a:r>
+              <a:t>ListBucket on "inter-bucket-copy-src"</a:t>
+            </a:r>
+          </a:p>
+          <a:p>
+            <a:pPr>
+              <a:buFont typeface="Arial" pitchFamily="34" charset="0"/>
+              <a:buChar char="•"/>
+            </a:pPr>
             <a:r>
               <a:rPr lang="en-US" altLang="ja-JP" sz="1000" b="1" smtClean="0">
                 <a:solidFill>
                   <a:srgbClr val="FF0000"/>
                 </a:solidFill>
               </a:rPr>
-              <a:t>on </a:t>
-            </a:r>
-            <a:r>
-              <a:rPr lang="en-US" altLang="ja-JP" sz="1000" b="1" smtClean="0">
-                <a:solidFill>
-                  <a:srgbClr val="FF0000"/>
-                </a:solidFill>
-              </a:rPr>
-              <a:t>"inter-bucket-copy-src"</a:t>
-            </a:r>
-            <a:endParaRPr lang="en-US" altLang="ja-JP" sz="1000" b="1" smtClean="0">
-              <a:solidFill>
-                <a:srgbClr val="FF0000"/>
-              </a:solidFill>
-            </a:endParaRPr>
-          </a:p>
-          <a:p>
-            <a:pPr>
-              <a:buFont typeface="Arial" pitchFamily="34" charset="0"/>
-              <a:buChar char="•"/>
-            </a:pPr>
-            <a:r>
-              <a:rPr lang="en-US" altLang="ja-JP" sz="1000" b="1" smtClean="0">
-                <a:solidFill>
-                  <a:srgbClr val="FF0000"/>
-                </a:solidFill>
-              </a:rPr>
-              <a:t>GetObject </a:t>
-            </a:r>
-            <a:r>
-              <a:rPr lang="en-US" altLang="ja-JP" sz="1000" b="1" smtClean="0">
-                <a:solidFill>
-                  <a:srgbClr val="FF0000"/>
-                </a:solidFill>
-              </a:rPr>
-              <a:t>on </a:t>
-            </a:r>
-            <a:r>
-              <a:rPr lang="en-US" altLang="ja-JP" sz="1000" b="1" smtClean="0">
-                <a:solidFill>
-                  <a:srgbClr val="FF0000"/>
-                </a:solidFill>
-              </a:rPr>
-              <a:t>"inter-bucket-copy-src"</a:t>
-            </a:r>
-            <a:endParaRPr lang="en-US" altLang="ja-JP" sz="1000" b="1" smtClean="0">
-              <a:solidFill>
-                <a:srgbClr val="FF0000"/>
-              </a:solidFill>
-            </a:endParaRPr>
+              <a:t>GetObject on "inter-bucket-copy-src"</a:t>
+            </a:r>
           </a:p>
           <a:p>
             <a:pPr>
@@ -9682,7 +9489,6 @@
               <a:rPr lang="en-US" sz="800" b="1" smtClean="0"/>
               <a:t>inter-bucket-copy-src</a:t>
             </a:r>
-            <a:endParaRPr lang="en-US" sz="800" b="1" smtClean="0"/>
           </a:p>
           <a:p>
             <a:pPr algn="ctr"/>
@@ -9702,7 +9508,7 @@
           <a:blip r:embed="rId9" cstate="print">
             <a:extLst>
               <a:ext uri="{28A0092B-C50C-407E-A947-70E740481C1C}">
-                <a14:useLocalDpi xmlns:a14="http://schemas.microsoft.com/office/drawing/2010/main" xmlns="" val="0"/>
+                <a14:useLocalDpi xmlns="" xmlns:a14="http://schemas.microsoft.com/office/drawing/2010/main" val="0"/>
               </a:ext>
             </a:extLst>
           </a:blip>
@@ -9754,7 +9560,6 @@
               <a:rPr lang="en-US" sz="800" b="1" smtClean="0"/>
               <a:t>inter-bucket-copy-dst</a:t>
             </a:r>
-            <a:endParaRPr lang="en-US" sz="800" b="1" smtClean="0"/>
           </a:p>
           <a:p>
             <a:pPr algn="ctr"/>
@@ -9774,7 +9579,7 @@
           <a:blip r:embed="rId9" cstate="print">
             <a:extLst>
               <a:ext uri="{28A0092B-C50C-407E-A947-70E740481C1C}">
-                <a14:useLocalDpi xmlns:a14="http://schemas.microsoft.com/office/drawing/2010/main" xmlns="" val="0"/>
+                <a14:useLocalDpi xmlns="" xmlns:a14="http://schemas.microsoft.com/office/drawing/2010/main" val="0"/>
               </a:ext>
             </a:extLst>
           </a:blip>
@@ -9846,66 +9651,21 @@
                   <a:srgbClr val="FF0000"/>
                 </a:solidFill>
               </a:rPr>
-              <a:t>ListBucket </a:t>
-            </a:r>
+              <a:t>ListBucket on "inter-bucket-copy-src" by "dst-role"</a:t>
+            </a:r>
+          </a:p>
+          <a:p>
+            <a:pPr>
+              <a:buFont typeface="Arial" pitchFamily="34" charset="0"/>
+              <a:buChar char="•"/>
+            </a:pPr>
             <a:r>
               <a:rPr lang="en-US" altLang="ja-JP" sz="900" b="1" smtClean="0">
                 <a:solidFill>
                   <a:srgbClr val="FF0000"/>
                 </a:solidFill>
               </a:rPr>
-              <a:t>on </a:t>
-            </a:r>
-            <a:r>
-              <a:rPr lang="en-US" altLang="ja-JP" sz="900" b="1" smtClean="0">
-                <a:solidFill>
-                  <a:srgbClr val="FF0000"/>
-                </a:solidFill>
-              </a:rPr>
-              <a:t>"inter-bucket-copy-src" by "dst-role"</a:t>
-            </a:r>
-            <a:endParaRPr lang="en-US" altLang="ja-JP" sz="900" b="1" smtClean="0">
-              <a:solidFill>
-                <a:srgbClr val="FF0000"/>
-              </a:solidFill>
-            </a:endParaRPr>
-          </a:p>
-          <a:p>
-            <a:pPr>
-              <a:buFont typeface="Arial" pitchFamily="34" charset="0"/>
-              <a:buChar char="•"/>
-            </a:pPr>
-            <a:r>
-              <a:rPr lang="en-US" altLang="ja-JP" sz="900" b="1" smtClean="0">
-                <a:solidFill>
-                  <a:srgbClr val="FF0000"/>
-                </a:solidFill>
-              </a:rPr>
-              <a:t>GetObject </a:t>
-            </a:r>
-            <a:r>
-              <a:rPr lang="en-US" altLang="ja-JP" sz="900" b="1" smtClean="0">
-                <a:solidFill>
-                  <a:srgbClr val="FF0000"/>
-                </a:solidFill>
-              </a:rPr>
-              <a:t>on </a:t>
-            </a:r>
-            <a:r>
-              <a:rPr lang="en-US" altLang="ja-JP" sz="900" b="1" smtClean="0">
-                <a:solidFill>
-                  <a:srgbClr val="FF0000"/>
-                </a:solidFill>
-              </a:rPr>
-              <a:t>"inter-bucket-copy-src" </a:t>
-            </a:r>
-            <a:r>
-              <a:rPr lang="en-US" altLang="ja-JP" sz="900" b="1" smtClean="0">
-                <a:solidFill>
-                  <a:srgbClr val="FF0000"/>
-                </a:solidFill>
-              </a:rPr>
-              <a:t> by "dst-role"</a:t>
+              <a:t>GetObject on "inter-bucket-copy-src"  by "dst-role"</a:t>
             </a:r>
           </a:p>
         </p:txBody>
@@ -9922,7 +9682,7 @@
           <a:blip r:embed="rId4" cstate="print">
             <a:extLst>
               <a:ext uri="{28A0092B-C50C-407E-A947-70E740481C1C}">
-                <a14:useLocalDpi xmlns:a14="http://schemas.microsoft.com/office/drawing/2010/main" xmlns="" val="0"/>
+                <a14:useLocalDpi xmlns="" xmlns:a14="http://schemas.microsoft.com/office/drawing/2010/main" val="0"/>
               </a:ext>
             </a:extLst>
           </a:blip>
@@ -10045,6 +9805,2049 @@
               <a:t>Make sure that the permissions to access the  source bucket are no longer needed.</a:t>
             </a:r>
             <a:endParaRPr kumimoji="1" lang="ja-JP" altLang="en-US" sz="800"/>
+          </a:p>
+        </p:txBody>
+      </p:sp>
+    </p:spTree>
+  </p:cSld>
+  <p:clrMapOvr>
+    <a:masterClrMapping/>
+  </p:clrMapOvr>
+</p:sld>
+</file>
+
+<file path=ppt/slides/slide6.xml><?xml version="1.0" encoding="utf-8"?>
+<p:sld xmlns:a="http://schemas.openxmlformats.org/drawingml/2006/main" xmlns:r="http://schemas.openxmlformats.org/officeDocument/2006/relationships" xmlns:p="http://schemas.openxmlformats.org/presentationml/2006/main">
+  <p:cSld>
+    <p:spTree>
+      <p:nvGrpSpPr>
+        <p:cNvPr id="1" name=""/>
+        <p:cNvGrpSpPr/>
+        <p:nvPr/>
+      </p:nvGrpSpPr>
+      <p:grpSpPr>
+        <a:xfrm>
+          <a:off x="0" y="0"/>
+          <a:ext cx="0" cy="0"/>
+          <a:chOff x="0" y="0"/>
+          <a:chExt cx="0" cy="0"/>
+        </a:xfrm>
+      </p:grpSpPr>
+      <p:sp>
+        <p:nvSpPr>
+          <p:cNvPr id="2" name="タイトル 1"/>
+          <p:cNvSpPr>
+            <a:spLocks noGrp="1"/>
+          </p:cNvSpPr>
+          <p:nvPr>
+            <p:ph type="title"/>
+          </p:nvPr>
+        </p:nvSpPr>
+        <p:spPr/>
+        <p:txBody>
+          <a:bodyPr>
+            <a:noAutofit/>
+          </a:bodyPr>
+          <a:lstStyle/>
+          <a:p>
+            <a:r>
+              <a:rPr lang="en-US" altLang="ja-JP" sz="2400" smtClean="0"/>
+              <a:t>The best way we have achieved.</a:t>
+            </a:r>
+            <a:br>
+              <a:rPr lang="en-US" altLang="ja-JP" sz="2400" smtClean="0"/>
+            </a:br>
+            <a:r>
+              <a:rPr lang="en-US" altLang="ja-JP" sz="2400" smtClean="0"/>
+              <a:t>Type2.1: Adding </a:t>
+            </a:r>
+            <a:r>
+              <a:rPr lang="en-US" altLang="ja-JP" sz="2400" smtClean="0"/>
+              <a:t>bucket </a:t>
+            </a:r>
+            <a:r>
+              <a:rPr lang="en-US" altLang="ja-JP" sz="2400" smtClean="0"/>
+              <a:t>policies </a:t>
+            </a:r>
+            <a:r>
+              <a:rPr lang="en-US" altLang="ja-JP" sz="2400" smtClean="0"/>
+              <a:t>to the source </a:t>
+            </a:r>
+            <a:r>
+              <a:rPr lang="en-US" altLang="ja-JP" sz="2400" smtClean="0"/>
+              <a:t>bucket and using IAM Role for EC2 instances.</a:t>
+            </a:r>
+            <a:endParaRPr kumimoji="1" lang="ja-JP" altLang="en-US" sz="2400"/>
+          </a:p>
+        </p:txBody>
+      </p:sp>
+      <p:sp>
+        <p:nvSpPr>
+          <p:cNvPr id="3" name="Rounded Rectangle 2"/>
+          <p:cNvSpPr/>
+          <p:nvPr/>
+        </p:nvSpPr>
+        <p:spPr>
+          <a:xfrm>
+            <a:off x="251520" y="1988840"/>
+            <a:ext cx="3960440" cy="4176464"/>
+          </a:xfrm>
+          <a:prstGeom prst="roundRect">
+            <a:avLst>
+              <a:gd name="adj" fmla="val 9818"/>
+            </a:avLst>
+          </a:prstGeom>
+          <a:noFill/>
+          <a:ln w="6350">
+            <a:solidFill>
+              <a:schemeClr val="tx1"/>
+            </a:solidFill>
+            <a:prstDash val="solid"/>
+          </a:ln>
+          <a:effectLst/>
+        </p:spPr>
+        <p:style>
+          <a:lnRef idx="1">
+            <a:schemeClr val="accent1"/>
+          </a:lnRef>
+          <a:fillRef idx="3">
+            <a:schemeClr val="accent1"/>
+          </a:fillRef>
+          <a:effectRef idx="2">
+            <a:schemeClr val="accent1"/>
+          </a:effectRef>
+          <a:fontRef idx="minor">
+            <a:schemeClr val="lt1"/>
+          </a:fontRef>
+        </p:style>
+        <p:txBody>
+          <a:bodyPr anchor="ctr"/>
+          <a:lstStyle/>
+          <a:p>
+            <a:pPr algn="ctr" fontAlgn="auto">
+              <a:spcBef>
+                <a:spcPts val="0"/>
+              </a:spcBef>
+              <a:spcAft>
+                <a:spcPts val="0"/>
+              </a:spcAft>
+              <a:defRPr/>
+            </a:pPr>
+            <a:endParaRPr lang="en-US" dirty="0">
+              <a:solidFill>
+                <a:schemeClr val="tx1"/>
+              </a:solidFill>
+              <a:latin typeface="Arial"/>
+              <a:cs typeface="Arial"/>
+            </a:endParaRPr>
+          </a:p>
+        </p:txBody>
+      </p:sp>
+      <p:sp>
+        <p:nvSpPr>
+          <p:cNvPr id="4" name="TextBox 5"/>
+          <p:cNvSpPr txBox="1">
+            <a:spLocks noChangeArrowheads="1"/>
+          </p:cNvSpPr>
+          <p:nvPr/>
+        </p:nvSpPr>
+        <p:spPr bwMode="auto">
+          <a:xfrm>
+            <a:off x="1043608" y="1700808"/>
+            <a:ext cx="1008112" cy="288032"/>
+          </a:xfrm>
+          <a:prstGeom prst="rect">
+            <a:avLst/>
+          </a:prstGeom>
+          <a:noFill/>
+          <a:ln w="9525">
+            <a:noFill/>
+            <a:miter lim="800000"/>
+            <a:headEnd/>
+            <a:tailEnd/>
+          </a:ln>
+        </p:spPr>
+        <p:txBody>
+          <a:bodyPr lIns="0" tIns="0" rIns="0" bIns="0">
+            <a:noAutofit/>
+          </a:bodyPr>
+          <a:lstStyle/>
+          <a:p>
+            <a:pPr algn="ctr"/>
+            <a:r>
+              <a:rPr lang="en-US" sz="900" b="1" smtClean="0">
+                <a:latin typeface="+mj-lt"/>
+                <a:ea typeface="Verdana" pitchFamily="34" charset="0"/>
+                <a:cs typeface="Helvetica Neue"/>
+              </a:rPr>
+              <a:t>AWS account</a:t>
+            </a:r>
+          </a:p>
+          <a:p>
+            <a:pPr algn="ctr"/>
+            <a:r>
+              <a:rPr lang="en-US" sz="900" b="1" smtClean="0">
+                <a:latin typeface="+mj-lt"/>
+                <a:ea typeface="Verdana" pitchFamily="34" charset="0"/>
+                <a:cs typeface="Helvetica Neue"/>
+              </a:rPr>
+              <a:t>111111111111111</a:t>
+            </a:r>
+            <a:endParaRPr lang="en-US" sz="900" b="1" dirty="0">
+              <a:latin typeface="+mj-lt"/>
+              <a:ea typeface="Verdana" pitchFamily="34" charset="0"/>
+              <a:cs typeface="Helvetica Neue"/>
+            </a:endParaRPr>
+          </a:p>
+        </p:txBody>
+      </p:sp>
+      <p:pic>
+        <p:nvPicPr>
+          <p:cNvPr id="5" name="Picture 9"/>
+          <p:cNvPicPr>
+            <a:picLocks noChangeAspect="1"/>
+          </p:cNvPicPr>
+          <p:nvPr/>
+        </p:nvPicPr>
+        <p:blipFill>
+          <a:blip r:embed="rId2" cstate="print">
+            <a:extLst>
+              <a:ext uri="{28A0092B-C50C-407E-A947-70E740481C1C}">
+                <a14:useLocalDpi xmlns="" xmlns:a14="http://schemas.microsoft.com/office/drawing/2010/main" val="0"/>
+              </a:ext>
+            </a:extLst>
+          </a:blip>
+          <a:stretch>
+            <a:fillRect/>
+          </a:stretch>
+        </p:blipFill>
+        <p:spPr>
+          <a:xfrm>
+            <a:off x="611560" y="1772816"/>
+            <a:ext cx="399410" cy="399410"/>
+          </a:xfrm>
+          <a:prstGeom prst="rect">
+            <a:avLst/>
+          </a:prstGeom>
+        </p:spPr>
+      </p:pic>
+      <p:sp>
+        <p:nvSpPr>
+          <p:cNvPr id="14" name="TextBox 28"/>
+          <p:cNvSpPr txBox="1"/>
+          <p:nvPr/>
+        </p:nvSpPr>
+        <p:spPr>
+          <a:xfrm>
+            <a:off x="1043608" y="5805264"/>
+            <a:ext cx="720080" cy="144016"/>
+          </a:xfrm>
+          <a:prstGeom prst="rect">
+            <a:avLst/>
+          </a:prstGeom>
+          <a:noFill/>
+        </p:spPr>
+        <p:txBody>
+          <a:bodyPr wrap="square" lIns="0" tIns="0" rIns="0" bIns="0" rtlCol="0" anchor="t">
+            <a:noAutofit/>
+          </a:bodyPr>
+          <a:lstStyle/>
+          <a:p>
+            <a:pPr algn="ctr"/>
+            <a:r>
+              <a:rPr lang="en-US" sz="800" b="1" dirty="0"/>
+              <a:t>p</a:t>
+            </a:r>
+            <a:r>
+              <a:rPr lang="en-US" sz="800" b="1" dirty="0" smtClean="0"/>
+              <a:t>ermissions</a:t>
+            </a:r>
+            <a:endParaRPr lang="en-US" sz="1400" b="1" dirty="0"/>
+          </a:p>
+        </p:txBody>
+      </p:sp>
+      <p:pic>
+        <p:nvPicPr>
+          <p:cNvPr id="15" name="Picture 29"/>
+          <p:cNvPicPr>
+            <a:picLocks noChangeAspect="1"/>
+          </p:cNvPicPr>
+          <p:nvPr/>
+        </p:nvPicPr>
+        <p:blipFill>
+          <a:blip r:embed="rId3" cstate="print">
+            <a:extLst>
+              <a:ext uri="{28A0092B-C50C-407E-A947-70E740481C1C}">
+                <a14:useLocalDpi xmlns="" xmlns:a14="http://schemas.microsoft.com/office/drawing/2010/main" val="0"/>
+              </a:ext>
+            </a:extLst>
+          </a:blip>
+          <a:stretch>
+            <a:fillRect/>
+          </a:stretch>
+        </p:blipFill>
+        <p:spPr>
+          <a:xfrm>
+            <a:off x="1259632" y="5445224"/>
+            <a:ext cx="288032" cy="384043"/>
+          </a:xfrm>
+          <a:prstGeom prst="rect">
+            <a:avLst/>
+          </a:prstGeom>
+        </p:spPr>
+      </p:pic>
+      <p:sp>
+        <p:nvSpPr>
+          <p:cNvPr id="19" name="右カーブ矢印 18"/>
+          <p:cNvSpPr/>
+          <p:nvPr/>
+        </p:nvSpPr>
+        <p:spPr>
+          <a:xfrm rot="10800000" flipH="1">
+            <a:off x="2555776" y="2996952"/>
+            <a:ext cx="648072" cy="1417971"/>
+          </a:xfrm>
+          <a:prstGeom prst="curvedRightArrow">
+            <a:avLst/>
+          </a:prstGeom>
+        </p:spPr>
+        <p:style>
+          <a:lnRef idx="1">
+            <a:schemeClr val="accent1"/>
+          </a:lnRef>
+          <a:fillRef idx="2">
+            <a:schemeClr val="accent1"/>
+          </a:fillRef>
+          <a:effectRef idx="1">
+            <a:schemeClr val="accent1"/>
+          </a:effectRef>
+          <a:fontRef idx="minor">
+            <a:schemeClr val="dk1"/>
+          </a:fontRef>
+        </p:style>
+        <p:txBody>
+          <a:bodyPr rtlCol="0" anchor="ctr"/>
+          <a:lstStyle/>
+          <a:p>
+            <a:pPr algn="ctr"/>
+            <a:endParaRPr kumimoji="1" lang="ja-JP" altLang="en-US">
+              <a:solidFill>
+                <a:schemeClr val="tx1"/>
+              </a:solidFill>
+            </a:endParaRPr>
+          </a:p>
+        </p:txBody>
+      </p:sp>
+      <p:sp>
+        <p:nvSpPr>
+          <p:cNvPr id="20" name="右矢印 19"/>
+          <p:cNvSpPr/>
+          <p:nvPr/>
+        </p:nvSpPr>
+        <p:spPr>
+          <a:xfrm>
+            <a:off x="3779912" y="2852936"/>
+            <a:ext cx="1512168" cy="432048"/>
+          </a:xfrm>
+          <a:prstGeom prst="rightArrow">
+            <a:avLst/>
+          </a:prstGeom>
+        </p:spPr>
+        <p:style>
+          <a:lnRef idx="1">
+            <a:schemeClr val="accent1"/>
+          </a:lnRef>
+          <a:fillRef idx="2">
+            <a:schemeClr val="accent1"/>
+          </a:fillRef>
+          <a:effectRef idx="1">
+            <a:schemeClr val="accent1"/>
+          </a:effectRef>
+          <a:fontRef idx="minor">
+            <a:schemeClr val="dk1"/>
+          </a:fontRef>
+        </p:style>
+        <p:txBody>
+          <a:bodyPr rtlCol="0" anchor="ctr"/>
+          <a:lstStyle/>
+          <a:p>
+            <a:pPr algn="ctr"/>
+            <a:endParaRPr kumimoji="1" lang="ja-JP" altLang="en-US"/>
+          </a:p>
+        </p:txBody>
+      </p:sp>
+      <p:cxnSp>
+        <p:nvCxnSpPr>
+          <p:cNvPr id="22" name="直線コネクタ 21"/>
+          <p:cNvCxnSpPr>
+            <a:stCxn id="48" idx="1"/>
+            <a:endCxn id="15" idx="3"/>
+          </p:cNvCxnSpPr>
+          <p:nvPr/>
+        </p:nvCxnSpPr>
+        <p:spPr>
+          <a:xfrm flipH="1" flipV="1">
+            <a:off x="1547664" y="5637246"/>
+            <a:ext cx="504056" cy="3429"/>
+          </a:xfrm>
+          <a:prstGeom prst="line">
+            <a:avLst/>
+          </a:prstGeom>
+        </p:spPr>
+        <p:style>
+          <a:lnRef idx="2">
+            <a:schemeClr val="accent3"/>
+          </a:lnRef>
+          <a:fillRef idx="0">
+            <a:schemeClr val="accent3"/>
+          </a:fillRef>
+          <a:effectRef idx="1">
+            <a:schemeClr val="accent3"/>
+          </a:effectRef>
+          <a:fontRef idx="minor">
+            <a:schemeClr val="tx1"/>
+          </a:fontRef>
+        </p:style>
+      </p:cxnSp>
+      <p:sp>
+        <p:nvSpPr>
+          <p:cNvPr id="25" name="テキスト ボックス 24"/>
+          <p:cNvSpPr txBox="1"/>
+          <p:nvPr/>
+        </p:nvSpPr>
+        <p:spPr>
+          <a:xfrm>
+            <a:off x="3707904" y="2492896"/>
+            <a:ext cx="1728192" cy="534368"/>
+          </a:xfrm>
+          <a:prstGeom prst="rect">
+            <a:avLst/>
+          </a:prstGeom>
+          <a:solidFill>
+            <a:schemeClr val="bg1">
+              <a:alpha val="50000"/>
+            </a:schemeClr>
+          </a:solidFill>
+          <a:ln>
+            <a:solidFill>
+              <a:schemeClr val="tx1"/>
+            </a:solidFill>
+          </a:ln>
+        </p:spPr>
+        <p:txBody>
+          <a:bodyPr wrap="square" lIns="36000" tIns="36000" rIns="36000" bIns="36000" rtlCol="0">
+            <a:spAutoFit/>
+          </a:bodyPr>
+          <a:lstStyle/>
+          <a:p>
+            <a:r>
+              <a:rPr kumimoji="1" lang="en-US" altLang="ja-JP" sz="1000" smtClean="0"/>
+              <a:t>5. </a:t>
+            </a:r>
+            <a:r>
+              <a:rPr kumimoji="1" lang="en-US" altLang="ja-JP" sz="1000" smtClean="0"/>
+              <a:t>The object will be copied from the Source bucket to the Destination bucket.</a:t>
+            </a:r>
+            <a:endParaRPr kumimoji="1" lang="ja-JP" altLang="en-US" sz="1000"/>
+          </a:p>
+        </p:txBody>
+      </p:sp>
+      <p:sp>
+        <p:nvSpPr>
+          <p:cNvPr id="45" name="四角形吹き出し 44"/>
+          <p:cNvSpPr/>
+          <p:nvPr/>
+        </p:nvSpPr>
+        <p:spPr>
+          <a:xfrm>
+            <a:off x="6084168" y="2420888"/>
+            <a:ext cx="936104" cy="288032"/>
+          </a:xfrm>
+          <a:prstGeom prst="wedgeRectCallout">
+            <a:avLst>
+              <a:gd name="adj1" fmla="val -85650"/>
+              <a:gd name="adj2" fmla="val 105308"/>
+            </a:avLst>
+          </a:prstGeom>
+        </p:spPr>
+        <p:style>
+          <a:lnRef idx="1">
+            <a:schemeClr val="accent2"/>
+          </a:lnRef>
+          <a:fillRef idx="2">
+            <a:schemeClr val="accent2"/>
+          </a:fillRef>
+          <a:effectRef idx="1">
+            <a:schemeClr val="accent2"/>
+          </a:effectRef>
+          <a:fontRef idx="minor">
+            <a:schemeClr val="dk1"/>
+          </a:fontRef>
+        </p:style>
+        <p:txBody>
+          <a:bodyPr lIns="36000" tIns="36000" rIns="36000" bIns="36000" rtlCol="0" anchor="t"/>
+          <a:lstStyle/>
+          <a:p>
+            <a:r>
+              <a:rPr lang="en-US" altLang="ja-JP" sz="800" smtClean="0"/>
+              <a:t>The bucket has no bucket policy.</a:t>
+            </a:r>
+            <a:endParaRPr kumimoji="1" lang="ja-JP" altLang="en-US" sz="800"/>
+          </a:p>
+        </p:txBody>
+      </p:sp>
+      <p:sp>
+        <p:nvSpPr>
+          <p:cNvPr id="29" name="Rounded Rectangle 2"/>
+          <p:cNvSpPr/>
+          <p:nvPr/>
+        </p:nvSpPr>
+        <p:spPr>
+          <a:xfrm>
+            <a:off x="4932040" y="1988840"/>
+            <a:ext cx="3960440" cy="4176464"/>
+          </a:xfrm>
+          <a:prstGeom prst="roundRect">
+            <a:avLst>
+              <a:gd name="adj" fmla="val 9818"/>
+            </a:avLst>
+          </a:prstGeom>
+          <a:noFill/>
+          <a:ln w="6350">
+            <a:solidFill>
+              <a:schemeClr val="tx1"/>
+            </a:solidFill>
+            <a:prstDash val="solid"/>
+          </a:ln>
+          <a:effectLst/>
+        </p:spPr>
+        <p:style>
+          <a:lnRef idx="1">
+            <a:schemeClr val="accent1"/>
+          </a:lnRef>
+          <a:fillRef idx="3">
+            <a:schemeClr val="accent1"/>
+          </a:fillRef>
+          <a:effectRef idx="2">
+            <a:schemeClr val="accent1"/>
+          </a:effectRef>
+          <a:fontRef idx="minor">
+            <a:schemeClr val="lt1"/>
+          </a:fontRef>
+        </p:style>
+        <p:txBody>
+          <a:bodyPr anchor="ctr"/>
+          <a:lstStyle/>
+          <a:p>
+            <a:pPr algn="ctr" fontAlgn="auto">
+              <a:spcBef>
+                <a:spcPts val="0"/>
+              </a:spcBef>
+              <a:spcAft>
+                <a:spcPts val="0"/>
+              </a:spcAft>
+              <a:defRPr/>
+            </a:pPr>
+            <a:endParaRPr lang="en-US" dirty="0">
+              <a:solidFill>
+                <a:schemeClr val="tx1"/>
+              </a:solidFill>
+              <a:latin typeface="Arial"/>
+              <a:cs typeface="Arial"/>
+            </a:endParaRPr>
+          </a:p>
+        </p:txBody>
+      </p:sp>
+      <p:sp>
+        <p:nvSpPr>
+          <p:cNvPr id="30" name="TextBox 5"/>
+          <p:cNvSpPr txBox="1">
+            <a:spLocks noChangeArrowheads="1"/>
+          </p:cNvSpPr>
+          <p:nvPr/>
+        </p:nvSpPr>
+        <p:spPr bwMode="auto">
+          <a:xfrm>
+            <a:off x="7164288" y="1700808"/>
+            <a:ext cx="1152128" cy="288032"/>
+          </a:xfrm>
+          <a:prstGeom prst="rect">
+            <a:avLst/>
+          </a:prstGeom>
+          <a:noFill/>
+          <a:ln w="9525">
+            <a:noFill/>
+            <a:miter lim="800000"/>
+            <a:headEnd/>
+            <a:tailEnd/>
+          </a:ln>
+        </p:spPr>
+        <p:txBody>
+          <a:bodyPr lIns="0" tIns="0" rIns="0" bIns="0">
+            <a:noAutofit/>
+          </a:bodyPr>
+          <a:lstStyle/>
+          <a:p>
+            <a:pPr algn="ctr"/>
+            <a:r>
+              <a:rPr lang="en-US" sz="900" b="1" smtClean="0">
+                <a:latin typeface="+mj-lt"/>
+                <a:ea typeface="Verdana" pitchFamily="34" charset="0"/>
+                <a:cs typeface="Helvetica Neue"/>
+              </a:rPr>
+              <a:t>AWS account</a:t>
+            </a:r>
+          </a:p>
+          <a:p>
+            <a:pPr algn="ctr"/>
+            <a:r>
+              <a:rPr lang="en-US" sz="900" b="1" smtClean="0">
+                <a:latin typeface="+mj-lt"/>
+                <a:ea typeface="Verdana" pitchFamily="34" charset="0"/>
+                <a:cs typeface="Helvetica Neue"/>
+              </a:rPr>
+              <a:t>999999999999999</a:t>
+            </a:r>
+            <a:endParaRPr lang="en-US" sz="900" b="1" dirty="0">
+              <a:latin typeface="+mj-lt"/>
+              <a:ea typeface="Verdana" pitchFamily="34" charset="0"/>
+              <a:cs typeface="Helvetica Neue"/>
+            </a:endParaRPr>
+          </a:p>
+        </p:txBody>
+      </p:sp>
+      <p:pic>
+        <p:nvPicPr>
+          <p:cNvPr id="31" name="Picture 9"/>
+          <p:cNvPicPr>
+            <a:picLocks noChangeAspect="1"/>
+          </p:cNvPicPr>
+          <p:nvPr/>
+        </p:nvPicPr>
+        <p:blipFill>
+          <a:blip r:embed="rId2" cstate="print">
+            <a:extLst>
+              <a:ext uri="{28A0092B-C50C-407E-A947-70E740481C1C}">
+                <a14:useLocalDpi xmlns="" xmlns:a14="http://schemas.microsoft.com/office/drawing/2010/main" val="0"/>
+              </a:ext>
+            </a:extLst>
+          </a:blip>
+          <a:stretch>
+            <a:fillRect/>
+          </a:stretch>
+        </p:blipFill>
+        <p:spPr>
+          <a:xfrm>
+            <a:off x="8244408" y="1700808"/>
+            <a:ext cx="399410" cy="399410"/>
+          </a:xfrm>
+          <a:prstGeom prst="rect">
+            <a:avLst/>
+          </a:prstGeom>
+        </p:spPr>
+      </p:pic>
+      <p:sp>
+        <p:nvSpPr>
+          <p:cNvPr id="40" name="TextBox 28"/>
+          <p:cNvSpPr txBox="1"/>
+          <p:nvPr/>
+        </p:nvSpPr>
+        <p:spPr>
+          <a:xfrm>
+            <a:off x="5652120" y="5445224"/>
+            <a:ext cx="720080" cy="144016"/>
+          </a:xfrm>
+          <a:prstGeom prst="rect">
+            <a:avLst/>
+          </a:prstGeom>
+          <a:noFill/>
+        </p:spPr>
+        <p:txBody>
+          <a:bodyPr wrap="square" lIns="0" tIns="0" rIns="0" bIns="0" rtlCol="0" anchor="t">
+            <a:noAutofit/>
+          </a:bodyPr>
+          <a:lstStyle/>
+          <a:p>
+            <a:pPr algn="ctr"/>
+            <a:r>
+              <a:rPr lang="en-US" sz="800" b="1" dirty="0"/>
+              <a:t>p</a:t>
+            </a:r>
+            <a:r>
+              <a:rPr lang="en-US" sz="800" b="1" dirty="0" smtClean="0"/>
+              <a:t>ermissions</a:t>
+            </a:r>
+            <a:endParaRPr lang="en-US" sz="1400" b="1" dirty="0"/>
+          </a:p>
+        </p:txBody>
+      </p:sp>
+      <p:pic>
+        <p:nvPicPr>
+          <p:cNvPr id="41" name="Picture 29"/>
+          <p:cNvPicPr>
+            <a:picLocks noChangeAspect="1"/>
+          </p:cNvPicPr>
+          <p:nvPr/>
+        </p:nvPicPr>
+        <p:blipFill>
+          <a:blip r:embed="rId3" cstate="print">
+            <a:extLst>
+              <a:ext uri="{28A0092B-C50C-407E-A947-70E740481C1C}">
+                <a14:useLocalDpi xmlns="" xmlns:a14="http://schemas.microsoft.com/office/drawing/2010/main" val="0"/>
+              </a:ext>
+            </a:extLst>
+          </a:blip>
+          <a:stretch>
+            <a:fillRect/>
+          </a:stretch>
+        </p:blipFill>
+        <p:spPr>
+          <a:xfrm>
+            <a:off x="5868144" y="5085184"/>
+            <a:ext cx="288032" cy="384043"/>
+          </a:xfrm>
+          <a:prstGeom prst="rect">
+            <a:avLst/>
+          </a:prstGeom>
+        </p:spPr>
+      </p:pic>
+      <p:cxnSp>
+        <p:nvCxnSpPr>
+          <p:cNvPr id="42" name="直線コネクタ 41"/>
+          <p:cNvCxnSpPr>
+            <a:stCxn id="34" idx="2"/>
+            <a:endCxn id="41" idx="0"/>
+          </p:cNvCxnSpPr>
+          <p:nvPr/>
+        </p:nvCxnSpPr>
+        <p:spPr>
+          <a:xfrm>
+            <a:off x="6012160" y="4611989"/>
+            <a:ext cx="0" cy="473195"/>
+          </a:xfrm>
+          <a:prstGeom prst="line">
+            <a:avLst/>
+          </a:prstGeom>
+        </p:spPr>
+        <p:style>
+          <a:lnRef idx="2">
+            <a:schemeClr val="accent3"/>
+          </a:lnRef>
+          <a:fillRef idx="0">
+            <a:schemeClr val="accent3"/>
+          </a:fillRef>
+          <a:effectRef idx="1">
+            <a:schemeClr val="accent3"/>
+          </a:effectRef>
+          <a:fontRef idx="minor">
+            <a:schemeClr val="tx1"/>
+          </a:fontRef>
+        </p:style>
+      </p:cxnSp>
+      <p:pic>
+        <p:nvPicPr>
+          <p:cNvPr id="34" name="Picture 45"/>
+          <p:cNvPicPr>
+            <a:picLocks noChangeAspect="1"/>
+          </p:cNvPicPr>
+          <p:nvPr/>
+        </p:nvPicPr>
+        <p:blipFill>
+          <a:blip r:embed="rId4" cstate="print">
+            <a:extLst>
+              <a:ext uri="{28A0092B-C50C-407E-A947-70E740481C1C}">
+                <a14:useLocalDpi xmlns="" xmlns:a14="http://schemas.microsoft.com/office/drawing/2010/main" val="0"/>
+              </a:ext>
+            </a:extLst>
+          </a:blip>
+          <a:stretch>
+            <a:fillRect/>
+          </a:stretch>
+        </p:blipFill>
+        <p:spPr>
+          <a:xfrm>
+            <a:off x="5868144" y="4365104"/>
+            <a:ext cx="288032" cy="246885"/>
+          </a:xfrm>
+          <a:prstGeom prst="rect">
+            <a:avLst/>
+          </a:prstGeom>
+        </p:spPr>
+      </p:pic>
+      <p:sp>
+        <p:nvSpPr>
+          <p:cNvPr id="33" name="TextBox 30"/>
+          <p:cNvSpPr txBox="1"/>
+          <p:nvPr/>
+        </p:nvSpPr>
+        <p:spPr>
+          <a:xfrm>
+            <a:off x="5724128" y="4581128"/>
+            <a:ext cx="576064" cy="216024"/>
+          </a:xfrm>
+          <a:prstGeom prst="rect">
+            <a:avLst/>
+          </a:prstGeom>
+          <a:noFill/>
+        </p:spPr>
+        <p:txBody>
+          <a:bodyPr wrap="square" lIns="0" tIns="0" rIns="0" bIns="0" rtlCol="0" anchor="t">
+            <a:noAutofit/>
+          </a:bodyPr>
+          <a:lstStyle/>
+          <a:p>
+            <a:pPr algn="ctr"/>
+            <a:r>
+              <a:rPr lang="en-US" sz="800" b="1" smtClean="0"/>
+              <a:t>IAM role</a:t>
+            </a:r>
+          </a:p>
+          <a:p>
+            <a:pPr algn="ctr"/>
+            <a:r>
+              <a:rPr lang="en-US" sz="800" b="1" smtClean="0"/>
+              <a:t>dst-role</a:t>
+            </a:r>
+            <a:endParaRPr lang="en-US" sz="800" b="1" dirty="0"/>
+          </a:p>
+        </p:txBody>
+      </p:sp>
+      <p:sp>
+        <p:nvSpPr>
+          <p:cNvPr id="64" name="右矢印 63"/>
+          <p:cNvSpPr/>
+          <p:nvPr/>
+        </p:nvSpPr>
+        <p:spPr>
+          <a:xfrm>
+            <a:off x="3419872" y="4869160"/>
+            <a:ext cx="2232248" cy="432048"/>
+          </a:xfrm>
+          <a:prstGeom prst="rightArrow">
+            <a:avLst/>
+          </a:prstGeom>
+        </p:spPr>
+        <p:style>
+          <a:lnRef idx="1">
+            <a:schemeClr val="accent1"/>
+          </a:lnRef>
+          <a:fillRef idx="2">
+            <a:schemeClr val="accent1"/>
+          </a:fillRef>
+          <a:effectRef idx="1">
+            <a:schemeClr val="accent1"/>
+          </a:effectRef>
+          <a:fontRef idx="minor">
+            <a:schemeClr val="dk1"/>
+          </a:fontRef>
+        </p:style>
+        <p:txBody>
+          <a:bodyPr rtlCol="0" anchor="ctr"/>
+          <a:lstStyle/>
+          <a:p>
+            <a:pPr algn="ctr"/>
+            <a:endParaRPr kumimoji="1" lang="ja-JP" altLang="en-US"/>
+          </a:p>
+        </p:txBody>
+      </p:sp>
+      <p:sp>
+        <p:nvSpPr>
+          <p:cNvPr id="65" name="左矢印 64"/>
+          <p:cNvSpPr/>
+          <p:nvPr/>
+        </p:nvSpPr>
+        <p:spPr>
+          <a:xfrm>
+            <a:off x="3491880" y="4437112"/>
+            <a:ext cx="2232248" cy="432048"/>
+          </a:xfrm>
+          <a:prstGeom prst="leftArrow">
+            <a:avLst/>
+          </a:prstGeom>
+        </p:spPr>
+        <p:style>
+          <a:lnRef idx="1">
+            <a:schemeClr val="accent1"/>
+          </a:lnRef>
+          <a:fillRef idx="2">
+            <a:schemeClr val="accent1"/>
+          </a:fillRef>
+          <a:effectRef idx="1">
+            <a:schemeClr val="accent1"/>
+          </a:effectRef>
+          <a:fontRef idx="minor">
+            <a:schemeClr val="dk1"/>
+          </a:fontRef>
+        </p:style>
+        <p:txBody>
+          <a:bodyPr rtlCol="0" anchor="ctr"/>
+          <a:lstStyle/>
+          <a:p>
+            <a:pPr algn="ctr"/>
+            <a:endParaRPr kumimoji="1" lang="ja-JP" altLang="en-US"/>
+          </a:p>
+        </p:txBody>
+      </p:sp>
+      <p:sp>
+        <p:nvSpPr>
+          <p:cNvPr id="66" name="テキスト ボックス 65"/>
+          <p:cNvSpPr txBox="1"/>
+          <p:nvPr/>
+        </p:nvSpPr>
+        <p:spPr>
+          <a:xfrm>
+            <a:off x="3419872" y="5229200"/>
+            <a:ext cx="1800200" cy="688256"/>
+          </a:xfrm>
+          <a:prstGeom prst="rect">
+            <a:avLst/>
+          </a:prstGeom>
+          <a:solidFill>
+            <a:schemeClr val="bg1">
+              <a:alpha val="50000"/>
+            </a:schemeClr>
+          </a:solidFill>
+          <a:ln>
+            <a:solidFill>
+              <a:schemeClr val="tx1"/>
+            </a:solidFill>
+          </a:ln>
+        </p:spPr>
+        <p:txBody>
+          <a:bodyPr wrap="square" lIns="36000" tIns="36000" rIns="36000" bIns="36000" rtlCol="0">
+            <a:spAutoFit/>
+          </a:bodyPr>
+          <a:lstStyle/>
+          <a:p>
+            <a:r>
+              <a:rPr kumimoji="1" lang="en-US" altLang="ja-JP" sz="1000" smtClean="0"/>
+              <a:t>2. </a:t>
+            </a:r>
+            <a:r>
+              <a:rPr kumimoji="1" lang="en-US" altLang="ja-JP" sz="1000" smtClean="0"/>
+              <a:t>Invoke "AssumeRole" to assume the "dst-role" with </a:t>
+            </a:r>
+            <a:r>
+              <a:rPr kumimoji="1" lang="en-US" altLang="ja-JP" sz="1000" smtClean="0"/>
+              <a:t>the temporary credentials retrieved from the EC2 instance.</a:t>
+            </a:r>
+            <a:endParaRPr kumimoji="1" lang="ja-JP" altLang="en-US" sz="1000"/>
+          </a:p>
+        </p:txBody>
+      </p:sp>
+      <p:grpSp>
+        <p:nvGrpSpPr>
+          <p:cNvPr id="9" name="グループ化 66"/>
+          <p:cNvGrpSpPr/>
+          <p:nvPr/>
+        </p:nvGrpSpPr>
+        <p:grpSpPr>
+          <a:xfrm>
+            <a:off x="3275856" y="4005064"/>
+            <a:ext cx="591835" cy="648072"/>
+            <a:chOff x="3548117" y="3501008"/>
+            <a:chExt cx="591835" cy="648072"/>
+          </a:xfrm>
+        </p:grpSpPr>
+        <p:pic>
+          <p:nvPicPr>
+            <p:cNvPr id="69" name="Picture 36"/>
+            <p:cNvPicPr>
+              <a:picLocks noChangeAspect="1"/>
+            </p:cNvPicPr>
+            <p:nvPr/>
+          </p:nvPicPr>
+          <p:blipFill>
+            <a:blip r:embed="rId5" cstate="print">
+              <a:extLst>
+                <a:ext uri="{28A0092B-C50C-407E-A947-70E740481C1C}">
+                  <a14:useLocalDpi xmlns="" xmlns:a14="http://schemas.microsoft.com/office/drawing/2010/main" val="0"/>
+                </a:ext>
+              </a:extLst>
+            </a:blip>
+            <a:stretch>
+              <a:fillRect/>
+            </a:stretch>
+          </p:blipFill>
+          <p:spPr>
+            <a:xfrm>
+              <a:off x="3635896" y="3501008"/>
+              <a:ext cx="400045" cy="360040"/>
+            </a:xfrm>
+            <a:prstGeom prst="rect">
+              <a:avLst/>
+            </a:prstGeom>
+          </p:spPr>
+        </p:pic>
+        <p:sp>
+          <p:nvSpPr>
+            <p:cNvPr id="68" name="TextBox 35"/>
+            <p:cNvSpPr txBox="1"/>
+            <p:nvPr/>
+          </p:nvSpPr>
+          <p:spPr>
+            <a:xfrm>
+              <a:off x="3548117" y="3645024"/>
+              <a:ext cx="591835" cy="504056"/>
+            </a:xfrm>
+            <a:prstGeom prst="rect">
+              <a:avLst/>
+            </a:prstGeom>
+            <a:solidFill>
+              <a:schemeClr val="bg1">
+                <a:alpha val="50000"/>
+              </a:schemeClr>
+            </a:solidFill>
+          </p:spPr>
+          <p:txBody>
+            <a:bodyPr wrap="square" lIns="0" tIns="0" rIns="0" bIns="0" rtlCol="0" anchor="t">
+              <a:noAutofit/>
+            </a:bodyPr>
+            <a:lstStyle/>
+            <a:p>
+              <a:pPr algn="ctr"/>
+              <a:r>
+                <a:rPr lang="en-US" sz="800" b="1" dirty="0"/>
+                <a:t>t</a:t>
+              </a:r>
+              <a:r>
+                <a:rPr lang="en-US" sz="800" b="1" dirty="0" smtClean="0"/>
+                <a:t>emporary </a:t>
+              </a:r>
+              <a:r>
+                <a:rPr lang="en-US" sz="800" b="1" smtClean="0"/>
+                <a:t>security </a:t>
+              </a:r>
+              <a:r>
+                <a:rPr lang="en-US" sz="800" b="1" smtClean="0"/>
+                <a:t>credential</a:t>
+              </a:r>
+              <a:endParaRPr lang="en-US" sz="800" b="1" smtClean="0"/>
+            </a:p>
+            <a:p>
+              <a:pPr algn="ctr"/>
+              <a:r>
+                <a:rPr lang="en-US" sz="800" b="1" smtClean="0"/>
+                <a:t>of "dst-role"</a:t>
+              </a:r>
+              <a:endParaRPr lang="en-US" sz="1400" b="1" dirty="0" smtClean="0"/>
+            </a:p>
+          </p:txBody>
+        </p:sp>
+      </p:grpSp>
+      <p:grpSp>
+        <p:nvGrpSpPr>
+          <p:cNvPr id="10" name="グループ化 60"/>
+          <p:cNvGrpSpPr/>
+          <p:nvPr/>
+        </p:nvGrpSpPr>
+        <p:grpSpPr>
+          <a:xfrm>
+            <a:off x="4355976" y="4653136"/>
+            <a:ext cx="432048" cy="504056"/>
+            <a:chOff x="827584" y="2708920"/>
+            <a:chExt cx="432048" cy="504056"/>
+          </a:xfrm>
+        </p:grpSpPr>
+        <p:pic>
+          <p:nvPicPr>
+            <p:cNvPr id="62" name="Picture 42"/>
+            <p:cNvPicPr>
+              <a:picLocks noChangeAspect="1"/>
+            </p:cNvPicPr>
+            <p:nvPr/>
+          </p:nvPicPr>
+          <p:blipFill>
+            <a:blip r:embed="rId6" cstate="print">
+              <a:extLst>
+                <a:ext uri="{28A0092B-C50C-407E-A947-70E740481C1C}">
+                  <a14:useLocalDpi xmlns="" xmlns:a14="http://schemas.microsoft.com/office/drawing/2010/main" val="0"/>
+                </a:ext>
+              </a:extLst>
+            </a:blip>
+            <a:stretch>
+              <a:fillRect/>
+            </a:stretch>
+          </p:blipFill>
+          <p:spPr>
+            <a:xfrm>
+              <a:off x="899592" y="2708920"/>
+              <a:ext cx="288032" cy="370328"/>
+            </a:xfrm>
+            <a:prstGeom prst="rect">
+              <a:avLst/>
+            </a:prstGeom>
+          </p:spPr>
+        </p:pic>
+        <p:sp>
+          <p:nvSpPr>
+            <p:cNvPr id="63" name="TextBox 43"/>
+            <p:cNvSpPr txBox="1"/>
+            <p:nvPr/>
+          </p:nvSpPr>
+          <p:spPr>
+            <a:xfrm>
+              <a:off x="827584" y="3068960"/>
+              <a:ext cx="432048" cy="144016"/>
+            </a:xfrm>
+            <a:prstGeom prst="rect">
+              <a:avLst/>
+            </a:prstGeom>
+            <a:noFill/>
+          </p:spPr>
+          <p:txBody>
+            <a:bodyPr wrap="square" lIns="0" tIns="0" rIns="0" bIns="0" rtlCol="0" anchor="t">
+              <a:noAutofit/>
+            </a:bodyPr>
+            <a:lstStyle/>
+            <a:p>
+              <a:pPr algn="ctr"/>
+              <a:r>
+                <a:rPr lang="en-US" sz="800" b="1"/>
+                <a:t>AWS </a:t>
+              </a:r>
+              <a:r>
+                <a:rPr lang="en-US" sz="800" b="1" smtClean="0"/>
+                <a:t>STS</a:t>
+              </a:r>
+              <a:endParaRPr lang="en-US" sz="1400" b="1" dirty="0"/>
+            </a:p>
+          </p:txBody>
+        </p:sp>
+      </p:grpSp>
+      <p:sp>
+        <p:nvSpPr>
+          <p:cNvPr id="70" name="テキスト ボックス 69"/>
+          <p:cNvSpPr txBox="1"/>
+          <p:nvPr/>
+        </p:nvSpPr>
+        <p:spPr>
+          <a:xfrm>
+            <a:off x="3923928" y="4077072"/>
+            <a:ext cx="2016224" cy="534368"/>
+          </a:xfrm>
+          <a:prstGeom prst="rect">
+            <a:avLst/>
+          </a:prstGeom>
+          <a:solidFill>
+            <a:schemeClr val="bg1">
+              <a:alpha val="50000"/>
+            </a:schemeClr>
+          </a:solidFill>
+          <a:ln>
+            <a:solidFill>
+              <a:schemeClr val="tx1"/>
+            </a:solidFill>
+          </a:ln>
+        </p:spPr>
+        <p:txBody>
+          <a:bodyPr wrap="square" lIns="36000" tIns="36000" rIns="36000" bIns="36000" rtlCol="0">
+            <a:spAutoFit/>
+          </a:bodyPr>
+          <a:lstStyle/>
+          <a:p>
+            <a:r>
+              <a:rPr lang="en-US" altLang="ja-JP" sz="1000" smtClean="0"/>
+              <a:t>3. </a:t>
+            </a:r>
+            <a:r>
+              <a:rPr kumimoji="1" lang="en-US" altLang="ja-JP" sz="1000" smtClean="0"/>
+              <a:t>You </a:t>
+            </a:r>
+            <a:r>
+              <a:rPr kumimoji="1" lang="en-US" altLang="ja-JP" sz="1000" smtClean="0"/>
+              <a:t>can obtain </a:t>
+            </a:r>
+            <a:r>
+              <a:rPr kumimoji="1" lang="en-US" altLang="ja-JP" sz="1000" smtClean="0"/>
+              <a:t>a set of  temporary </a:t>
+            </a:r>
+            <a:r>
+              <a:rPr kumimoji="1" lang="en-US" altLang="ja-JP" sz="1000" smtClean="0"/>
+              <a:t>credentials which has the dst-role's permissions.</a:t>
+            </a:r>
+            <a:endParaRPr kumimoji="1" lang="ja-JP" altLang="en-US" sz="1000"/>
+          </a:p>
+        </p:txBody>
+      </p:sp>
+      <p:sp>
+        <p:nvSpPr>
+          <p:cNvPr id="72" name="強調線吹き出し 1 (枠付き) 71"/>
+          <p:cNvSpPr/>
+          <p:nvPr/>
+        </p:nvSpPr>
+        <p:spPr>
+          <a:xfrm>
+            <a:off x="1475656" y="6093296"/>
+            <a:ext cx="1656184" cy="576064"/>
+          </a:xfrm>
+          <a:prstGeom prst="accentBorderCallout1">
+            <a:avLst>
+              <a:gd name="adj1" fmla="val 55625"/>
+              <a:gd name="adj2" fmla="val -6751"/>
+              <a:gd name="adj3" fmla="val -22894"/>
+              <a:gd name="adj4" fmla="val -11635"/>
+            </a:avLst>
+          </a:prstGeom>
+        </p:spPr>
+        <p:style>
+          <a:lnRef idx="1">
+            <a:schemeClr val="accent1"/>
+          </a:lnRef>
+          <a:fillRef idx="2">
+            <a:schemeClr val="accent1"/>
+          </a:fillRef>
+          <a:effectRef idx="1">
+            <a:schemeClr val="accent1"/>
+          </a:effectRef>
+          <a:fontRef idx="minor">
+            <a:schemeClr val="dk1"/>
+          </a:fontRef>
+        </p:style>
+        <p:txBody>
+          <a:bodyPr rtlCol="0" anchor="t"/>
+          <a:lstStyle/>
+          <a:p>
+            <a:r>
+              <a:rPr kumimoji="1" lang="en-US" altLang="ja-JP" sz="1000" smtClean="0"/>
+              <a:t>That </a:t>
+            </a:r>
+            <a:r>
+              <a:rPr lang="en-US" altLang="ja-JP" sz="1000" smtClean="0"/>
+              <a:t>role</a:t>
+            </a:r>
+            <a:r>
+              <a:rPr kumimoji="1" lang="en-US" altLang="ja-JP" sz="1000" smtClean="0"/>
+              <a:t> </a:t>
+            </a:r>
+            <a:r>
+              <a:rPr kumimoji="1" lang="en-US" altLang="ja-JP" sz="1000" smtClean="0"/>
+              <a:t>should have the following permissions.</a:t>
+            </a:r>
+          </a:p>
+          <a:p>
+            <a:pPr>
+              <a:buFont typeface="Arial" pitchFamily="34" charset="0"/>
+              <a:buChar char="•"/>
+            </a:pPr>
+            <a:r>
+              <a:rPr lang="en-US" altLang="ja-JP" sz="1000" smtClean="0"/>
+              <a:t>AssumeRole </a:t>
+            </a:r>
+            <a:r>
+              <a:rPr lang="en-US" altLang="ja-JP" sz="1000" smtClean="0"/>
+              <a:t>to "dst-role"</a:t>
+            </a:r>
+          </a:p>
+        </p:txBody>
+      </p:sp>
+      <p:sp>
+        <p:nvSpPr>
+          <p:cNvPr id="73" name="強調線吹き出し 1 (枠付き) 72"/>
+          <p:cNvSpPr/>
+          <p:nvPr/>
+        </p:nvSpPr>
+        <p:spPr>
+          <a:xfrm>
+            <a:off x="6444208" y="4221088"/>
+            <a:ext cx="2448272" cy="1152128"/>
+          </a:xfrm>
+          <a:prstGeom prst="accentBorderCallout1">
+            <a:avLst>
+              <a:gd name="adj1" fmla="val 68842"/>
+              <a:gd name="adj2" fmla="val -5275"/>
+              <a:gd name="adj3" fmla="val 80995"/>
+              <a:gd name="adj4" fmla="val -10831"/>
+            </a:avLst>
+          </a:prstGeom>
+        </p:spPr>
+        <p:style>
+          <a:lnRef idx="1">
+            <a:schemeClr val="accent1"/>
+          </a:lnRef>
+          <a:fillRef idx="2">
+            <a:schemeClr val="accent1"/>
+          </a:fillRef>
+          <a:effectRef idx="1">
+            <a:schemeClr val="accent1"/>
+          </a:effectRef>
+          <a:fontRef idx="minor">
+            <a:schemeClr val="dk1"/>
+          </a:fontRef>
+        </p:style>
+        <p:txBody>
+          <a:bodyPr rtlCol="0" anchor="t"/>
+          <a:lstStyle/>
+          <a:p>
+            <a:r>
+              <a:rPr kumimoji="1" lang="en-US" altLang="ja-JP" sz="1000" smtClean="0"/>
+              <a:t>That role should have the following permissions.</a:t>
+            </a:r>
+          </a:p>
+          <a:p>
+            <a:pPr>
+              <a:buFont typeface="Arial" pitchFamily="34" charset="0"/>
+              <a:buChar char="•"/>
+            </a:pPr>
+            <a:r>
+              <a:rPr lang="en-US" altLang="ja-JP" sz="1000" smtClean="0">
+                <a:solidFill>
+                  <a:schemeClr val="tx1"/>
+                </a:solidFill>
+              </a:rPr>
+              <a:t>ListBucket on "inter-bucket-copy-src"</a:t>
+            </a:r>
+          </a:p>
+          <a:p>
+            <a:pPr>
+              <a:buFont typeface="Arial" pitchFamily="34" charset="0"/>
+              <a:buChar char="•"/>
+            </a:pPr>
+            <a:r>
+              <a:rPr lang="en-US" altLang="ja-JP" sz="1000" smtClean="0">
+                <a:solidFill>
+                  <a:schemeClr val="tx1"/>
+                </a:solidFill>
+              </a:rPr>
+              <a:t>GetObject on "inter-bucket-copy-src"</a:t>
+            </a:r>
+          </a:p>
+          <a:p>
+            <a:pPr>
+              <a:buFont typeface="Arial" pitchFamily="34" charset="0"/>
+              <a:buChar char="•"/>
+            </a:pPr>
+            <a:r>
+              <a:rPr lang="en-US" altLang="ja-JP" sz="1000" smtClean="0"/>
+              <a:t>PutObject on "inter-bucket-copy-dst"</a:t>
+            </a:r>
+          </a:p>
+          <a:p>
+            <a:pPr>
+              <a:buFont typeface="Arial" pitchFamily="34" charset="0"/>
+              <a:buChar char="•"/>
+            </a:pPr>
+            <a:r>
+              <a:rPr lang="en-US" altLang="ja-JP" sz="1000" smtClean="0"/>
+              <a:t>TrustRelationships to allow "AssumeRole" by "</a:t>
+            </a:r>
+            <a:r>
+              <a:rPr lang="en-US" altLang="ja-JP" sz="1000" smtClean="0"/>
+              <a:t>src-role".</a:t>
+            </a:r>
+            <a:endParaRPr lang="en-US" altLang="ja-JP" sz="1000" smtClean="0"/>
+          </a:p>
+        </p:txBody>
+      </p:sp>
+      <p:sp>
+        <p:nvSpPr>
+          <p:cNvPr id="74" name="テキスト ボックス 73"/>
+          <p:cNvSpPr txBox="1"/>
+          <p:nvPr/>
+        </p:nvSpPr>
+        <p:spPr>
+          <a:xfrm>
+            <a:off x="323528" y="3717032"/>
+            <a:ext cx="2592288" cy="688256"/>
+          </a:xfrm>
+          <a:prstGeom prst="rect">
+            <a:avLst/>
+          </a:prstGeom>
+          <a:solidFill>
+            <a:schemeClr val="bg1">
+              <a:alpha val="50000"/>
+            </a:schemeClr>
+          </a:solidFill>
+          <a:ln>
+            <a:solidFill>
+              <a:schemeClr val="tx1"/>
+            </a:solidFill>
+          </a:ln>
+        </p:spPr>
+        <p:txBody>
+          <a:bodyPr wrap="square" lIns="36000" tIns="36000" rIns="36000" bIns="36000" rtlCol="0">
+            <a:spAutoFit/>
+          </a:bodyPr>
+          <a:lstStyle/>
+          <a:p>
+            <a:r>
+              <a:rPr kumimoji="1" lang="en-US" altLang="ja-JP" sz="1000" smtClean="0"/>
+              <a:t>4. </a:t>
+            </a:r>
+            <a:r>
+              <a:rPr kumimoji="1" lang="en-US" altLang="ja-JP" sz="1000" smtClean="0"/>
+              <a:t>Make a copy request with </a:t>
+            </a:r>
+            <a:r>
+              <a:rPr kumimoji="1" lang="en-US" altLang="ja-JP" sz="1000" smtClean="0"/>
+              <a:t>that </a:t>
+            </a:r>
+            <a:r>
+              <a:rPr kumimoji="1" lang="en-US" altLang="ja-JP" sz="1000" smtClean="0"/>
+              <a:t>temporary credentials.</a:t>
+            </a:r>
+          </a:p>
+          <a:p>
+            <a:r>
+              <a:rPr lang="en-US" altLang="ja-JP" sz="1000" smtClean="0"/>
+              <a:t>IOW, you issue a request with the dst-role's permissions.</a:t>
+            </a:r>
+            <a:endParaRPr kumimoji="1" lang="ja-JP" altLang="en-US" sz="1000"/>
+          </a:p>
+        </p:txBody>
+      </p:sp>
+      <p:sp>
+        <p:nvSpPr>
+          <p:cNvPr id="7" name="TextBox 7"/>
+          <p:cNvSpPr txBox="1"/>
+          <p:nvPr/>
+        </p:nvSpPr>
+        <p:spPr>
+          <a:xfrm>
+            <a:off x="2843808" y="3140968"/>
+            <a:ext cx="1008112" cy="216024"/>
+          </a:xfrm>
+          <a:prstGeom prst="rect">
+            <a:avLst/>
+          </a:prstGeom>
+          <a:noFill/>
+        </p:spPr>
+        <p:txBody>
+          <a:bodyPr wrap="square" lIns="0" tIns="0" rIns="0" bIns="0" rtlCol="0" anchor="t">
+            <a:noAutofit/>
+          </a:bodyPr>
+          <a:lstStyle/>
+          <a:p>
+            <a:pPr algn="ctr"/>
+            <a:r>
+              <a:rPr lang="en-US" sz="800" b="1" smtClean="0"/>
+              <a:t>S3 bucket</a:t>
+            </a:r>
+          </a:p>
+          <a:p>
+            <a:pPr algn="ctr"/>
+            <a:r>
+              <a:rPr lang="en-US" sz="800" b="1" smtClean="0"/>
+              <a:t>inter-bucket-copy-src</a:t>
+            </a:r>
+          </a:p>
+          <a:p>
+            <a:pPr algn="ctr"/>
+            <a:endParaRPr lang="en-US" sz="1400" b="1" dirty="0"/>
+          </a:p>
+        </p:txBody>
+      </p:sp>
+      <p:pic>
+        <p:nvPicPr>
+          <p:cNvPr id="8" name="Picture 8"/>
+          <p:cNvPicPr>
+            <a:picLocks noChangeAspect="1"/>
+          </p:cNvPicPr>
+          <p:nvPr/>
+        </p:nvPicPr>
+        <p:blipFill>
+          <a:blip r:embed="rId7" cstate="print">
+            <a:extLst>
+              <a:ext uri="{28A0092B-C50C-407E-A947-70E740481C1C}">
+                <a14:useLocalDpi xmlns="" xmlns:a14="http://schemas.microsoft.com/office/drawing/2010/main" val="0"/>
+              </a:ext>
+            </a:extLst>
+          </a:blip>
+          <a:stretch>
+            <a:fillRect/>
+          </a:stretch>
+        </p:blipFill>
+        <p:spPr>
+          <a:xfrm>
+            <a:off x="3203848" y="2852936"/>
+            <a:ext cx="288032" cy="298699"/>
+          </a:xfrm>
+          <a:prstGeom prst="rect">
+            <a:avLst/>
+          </a:prstGeom>
+        </p:spPr>
+      </p:pic>
+      <p:sp>
+        <p:nvSpPr>
+          <p:cNvPr id="59" name="TextBox 7"/>
+          <p:cNvSpPr txBox="1"/>
+          <p:nvPr/>
+        </p:nvSpPr>
+        <p:spPr>
+          <a:xfrm>
+            <a:off x="5148064" y="3140968"/>
+            <a:ext cx="1008112" cy="216024"/>
+          </a:xfrm>
+          <a:prstGeom prst="rect">
+            <a:avLst/>
+          </a:prstGeom>
+          <a:noFill/>
+        </p:spPr>
+        <p:txBody>
+          <a:bodyPr wrap="square" lIns="0" tIns="0" rIns="0" bIns="0" rtlCol="0" anchor="t">
+            <a:noAutofit/>
+          </a:bodyPr>
+          <a:lstStyle/>
+          <a:p>
+            <a:pPr algn="ctr"/>
+            <a:r>
+              <a:rPr lang="en-US" sz="800" b="1" smtClean="0"/>
+              <a:t>S3 bucket</a:t>
+            </a:r>
+          </a:p>
+          <a:p>
+            <a:pPr algn="ctr"/>
+            <a:r>
+              <a:rPr lang="en-US" sz="800" b="1" smtClean="0"/>
+              <a:t>inter-bucket-copy-dst</a:t>
+            </a:r>
+          </a:p>
+          <a:p>
+            <a:pPr algn="ctr"/>
+            <a:endParaRPr lang="en-US" sz="1400" b="1" dirty="0"/>
+          </a:p>
+        </p:txBody>
+      </p:sp>
+      <p:pic>
+        <p:nvPicPr>
+          <p:cNvPr id="60" name="Picture 8"/>
+          <p:cNvPicPr>
+            <a:picLocks noChangeAspect="1"/>
+          </p:cNvPicPr>
+          <p:nvPr/>
+        </p:nvPicPr>
+        <p:blipFill>
+          <a:blip r:embed="rId7" cstate="print">
+            <a:extLst>
+              <a:ext uri="{28A0092B-C50C-407E-A947-70E740481C1C}">
+                <a14:useLocalDpi xmlns="" xmlns:a14="http://schemas.microsoft.com/office/drawing/2010/main" val="0"/>
+              </a:ext>
+            </a:extLst>
+          </a:blip>
+          <a:stretch>
+            <a:fillRect/>
+          </a:stretch>
+        </p:blipFill>
+        <p:spPr>
+          <a:xfrm>
+            <a:off x="5508104" y="2852936"/>
+            <a:ext cx="288032" cy="298699"/>
+          </a:xfrm>
+          <a:prstGeom prst="rect">
+            <a:avLst/>
+          </a:prstGeom>
+        </p:spPr>
+      </p:pic>
+      <p:sp>
+        <p:nvSpPr>
+          <p:cNvPr id="46" name="強調線吹き出し 1 (枠付き) 45"/>
+          <p:cNvSpPr/>
+          <p:nvPr/>
+        </p:nvSpPr>
+        <p:spPr>
+          <a:xfrm>
+            <a:off x="107504" y="2348880"/>
+            <a:ext cx="2664296" cy="576064"/>
+          </a:xfrm>
+          <a:prstGeom prst="accentBorderCallout1">
+            <a:avLst>
+              <a:gd name="adj1" fmla="val 35018"/>
+              <a:gd name="adj2" fmla="val 105196"/>
+              <a:gd name="adj3" fmla="val 18112"/>
+              <a:gd name="adj4" fmla="val 114345"/>
+            </a:avLst>
+          </a:prstGeom>
+        </p:spPr>
+        <p:style>
+          <a:lnRef idx="1">
+            <a:schemeClr val="accent1"/>
+          </a:lnRef>
+          <a:fillRef idx="2">
+            <a:schemeClr val="accent1"/>
+          </a:fillRef>
+          <a:effectRef idx="1">
+            <a:schemeClr val="accent1"/>
+          </a:effectRef>
+          <a:fontRef idx="minor">
+            <a:schemeClr val="dk1"/>
+          </a:fontRef>
+        </p:style>
+        <p:txBody>
+          <a:bodyPr rtlCol="0" anchor="t"/>
+          <a:lstStyle/>
+          <a:p>
+            <a:r>
+              <a:rPr kumimoji="1" lang="en-US" altLang="ja-JP" sz="900" smtClean="0">
+                <a:solidFill>
+                  <a:schemeClr val="tx1"/>
+                </a:solidFill>
+              </a:rPr>
+              <a:t>That policy should have the following permissions.</a:t>
+            </a:r>
+          </a:p>
+          <a:p>
+            <a:pPr>
+              <a:buFont typeface="Arial" pitchFamily="34" charset="0"/>
+              <a:buChar char="•"/>
+            </a:pPr>
+            <a:r>
+              <a:rPr lang="en-US" altLang="ja-JP" sz="900" smtClean="0">
+                <a:solidFill>
+                  <a:schemeClr val="tx1"/>
+                </a:solidFill>
+              </a:rPr>
+              <a:t>ListBucket on "inter-bucket-copy-src" by "dst-role"</a:t>
+            </a:r>
+          </a:p>
+          <a:p>
+            <a:pPr>
+              <a:buFont typeface="Arial" pitchFamily="34" charset="0"/>
+              <a:buChar char="•"/>
+            </a:pPr>
+            <a:r>
+              <a:rPr lang="en-US" altLang="ja-JP" sz="900" smtClean="0">
+                <a:solidFill>
+                  <a:schemeClr val="tx1"/>
+                </a:solidFill>
+              </a:rPr>
+              <a:t>GetObject on "inter-bucket-copy-src"  by "dst-role"</a:t>
+            </a:r>
+          </a:p>
+        </p:txBody>
+      </p:sp>
+      <p:pic>
+        <p:nvPicPr>
+          <p:cNvPr id="47" name="Picture 29"/>
+          <p:cNvPicPr>
+            <a:picLocks noChangeAspect="1"/>
+          </p:cNvPicPr>
+          <p:nvPr/>
+        </p:nvPicPr>
+        <p:blipFill>
+          <a:blip r:embed="rId3" cstate="print">
+            <a:extLst>
+              <a:ext uri="{28A0092B-C50C-407E-A947-70E740481C1C}">
+                <a14:useLocalDpi xmlns="" xmlns:a14="http://schemas.microsoft.com/office/drawing/2010/main" val="0"/>
+              </a:ext>
+            </a:extLst>
+          </a:blip>
+          <a:stretch>
+            <a:fillRect/>
+          </a:stretch>
+        </p:blipFill>
+        <p:spPr>
+          <a:xfrm>
+            <a:off x="3203848" y="2132856"/>
+            <a:ext cx="288032" cy="384043"/>
+          </a:xfrm>
+          <a:prstGeom prst="rect">
+            <a:avLst/>
+          </a:prstGeom>
+        </p:spPr>
+      </p:pic>
+      <p:cxnSp>
+        <p:nvCxnSpPr>
+          <p:cNvPr id="49" name="直線コネクタ 48"/>
+          <p:cNvCxnSpPr>
+            <a:stCxn id="47" idx="2"/>
+            <a:endCxn id="8" idx="0"/>
+          </p:cNvCxnSpPr>
+          <p:nvPr/>
+        </p:nvCxnSpPr>
+        <p:spPr>
+          <a:xfrm>
+            <a:off x="3347864" y="2516899"/>
+            <a:ext cx="0" cy="336037"/>
+          </a:xfrm>
+          <a:prstGeom prst="line">
+            <a:avLst/>
+          </a:prstGeom>
+        </p:spPr>
+        <p:style>
+          <a:lnRef idx="2">
+            <a:schemeClr val="accent2"/>
+          </a:lnRef>
+          <a:fillRef idx="0">
+            <a:schemeClr val="accent2"/>
+          </a:fillRef>
+          <a:effectRef idx="1">
+            <a:schemeClr val="accent2"/>
+          </a:effectRef>
+          <a:fontRef idx="minor">
+            <a:schemeClr val="tx1"/>
+          </a:fontRef>
+        </p:style>
+      </p:cxnSp>
+      <p:sp>
+        <p:nvSpPr>
+          <p:cNvPr id="52" name="TextBox 28"/>
+          <p:cNvSpPr txBox="1"/>
+          <p:nvPr/>
+        </p:nvSpPr>
+        <p:spPr>
+          <a:xfrm>
+            <a:off x="2987824" y="2492896"/>
+            <a:ext cx="720080" cy="144016"/>
+          </a:xfrm>
+          <a:prstGeom prst="rect">
+            <a:avLst/>
+          </a:prstGeom>
+          <a:noFill/>
+        </p:spPr>
+        <p:txBody>
+          <a:bodyPr wrap="square" lIns="0" tIns="0" rIns="0" bIns="0" rtlCol="0" anchor="t">
+            <a:noAutofit/>
+          </a:bodyPr>
+          <a:lstStyle/>
+          <a:p>
+            <a:pPr algn="ctr"/>
+            <a:r>
+              <a:rPr lang="en-US" sz="800" b="1" smtClean="0"/>
+              <a:t>Bucket Policy</a:t>
+            </a:r>
+            <a:endParaRPr lang="en-US" sz="1400" b="1" dirty="0"/>
+          </a:p>
+        </p:txBody>
+      </p:sp>
+      <p:pic>
+        <p:nvPicPr>
+          <p:cNvPr id="48" name="Picture 45"/>
+          <p:cNvPicPr>
+            <a:picLocks noChangeAspect="1"/>
+          </p:cNvPicPr>
+          <p:nvPr/>
+        </p:nvPicPr>
+        <p:blipFill>
+          <a:blip r:embed="rId4" cstate="print">
+            <a:extLst>
+              <a:ext uri="{28A0092B-C50C-407E-A947-70E740481C1C}">
+                <a14:useLocalDpi xmlns="" xmlns:a14="http://schemas.microsoft.com/office/drawing/2010/main" val="0"/>
+              </a:ext>
+            </a:extLst>
+          </a:blip>
+          <a:stretch>
+            <a:fillRect/>
+          </a:stretch>
+        </p:blipFill>
+        <p:spPr>
+          <a:xfrm>
+            <a:off x="2051720" y="5517232"/>
+            <a:ext cx="288032" cy="246885"/>
+          </a:xfrm>
+          <a:prstGeom prst="rect">
+            <a:avLst/>
+          </a:prstGeom>
+        </p:spPr>
+      </p:pic>
+      <p:sp>
+        <p:nvSpPr>
+          <p:cNvPr id="50" name="TextBox 30"/>
+          <p:cNvSpPr txBox="1"/>
+          <p:nvPr/>
+        </p:nvSpPr>
+        <p:spPr>
+          <a:xfrm>
+            <a:off x="1907704" y="5733256"/>
+            <a:ext cx="576064" cy="216024"/>
+          </a:xfrm>
+          <a:prstGeom prst="rect">
+            <a:avLst/>
+          </a:prstGeom>
+          <a:noFill/>
+        </p:spPr>
+        <p:txBody>
+          <a:bodyPr wrap="square" lIns="0" tIns="0" rIns="0" bIns="0" rtlCol="0" anchor="t">
+            <a:noAutofit/>
+          </a:bodyPr>
+          <a:lstStyle/>
+          <a:p>
+            <a:pPr algn="ctr"/>
+            <a:r>
+              <a:rPr lang="en-US" sz="800" b="1" smtClean="0"/>
+              <a:t>IAM role</a:t>
+            </a:r>
+          </a:p>
+          <a:p>
+            <a:pPr algn="ctr"/>
+            <a:r>
+              <a:rPr lang="en-US" sz="800" b="1" smtClean="0"/>
+              <a:t>src-role</a:t>
+            </a:r>
+            <a:endParaRPr lang="en-US" sz="800" b="1" dirty="0"/>
+          </a:p>
+        </p:txBody>
+      </p:sp>
+      <p:grpSp>
+        <p:nvGrpSpPr>
+          <p:cNvPr id="54" name="グループ化 66"/>
+          <p:cNvGrpSpPr/>
+          <p:nvPr/>
+        </p:nvGrpSpPr>
+        <p:grpSpPr>
+          <a:xfrm>
+            <a:off x="2843808" y="4869160"/>
+            <a:ext cx="591835" cy="648072"/>
+            <a:chOff x="3548117" y="3501008"/>
+            <a:chExt cx="591835" cy="648072"/>
+          </a:xfrm>
+        </p:grpSpPr>
+        <p:pic>
+          <p:nvPicPr>
+            <p:cNvPr id="55" name="Picture 36"/>
+            <p:cNvPicPr>
+              <a:picLocks noChangeAspect="1"/>
+            </p:cNvPicPr>
+            <p:nvPr/>
+          </p:nvPicPr>
+          <p:blipFill>
+            <a:blip r:embed="rId5" cstate="print">
+              <a:extLst>
+                <a:ext uri="{28A0092B-C50C-407E-A947-70E740481C1C}">
+                  <a14:useLocalDpi xmlns="" xmlns:a14="http://schemas.microsoft.com/office/drawing/2010/main" val="0"/>
+                </a:ext>
+              </a:extLst>
+            </a:blip>
+            <a:stretch>
+              <a:fillRect/>
+            </a:stretch>
+          </p:blipFill>
+          <p:spPr>
+            <a:xfrm>
+              <a:off x="3635896" y="3501008"/>
+              <a:ext cx="400045" cy="360040"/>
+            </a:xfrm>
+            <a:prstGeom prst="rect">
+              <a:avLst/>
+            </a:prstGeom>
+          </p:spPr>
+        </p:pic>
+        <p:sp>
+          <p:nvSpPr>
+            <p:cNvPr id="56" name="TextBox 35"/>
+            <p:cNvSpPr txBox="1"/>
+            <p:nvPr/>
+          </p:nvSpPr>
+          <p:spPr>
+            <a:xfrm>
+              <a:off x="3548117" y="3645024"/>
+              <a:ext cx="591835" cy="504056"/>
+            </a:xfrm>
+            <a:prstGeom prst="rect">
+              <a:avLst/>
+            </a:prstGeom>
+            <a:solidFill>
+              <a:schemeClr val="bg1">
+                <a:alpha val="50000"/>
+              </a:schemeClr>
+            </a:solidFill>
+          </p:spPr>
+          <p:txBody>
+            <a:bodyPr wrap="square" lIns="0" tIns="0" rIns="0" bIns="0" rtlCol="0" anchor="t">
+              <a:noAutofit/>
+            </a:bodyPr>
+            <a:lstStyle/>
+            <a:p>
+              <a:pPr algn="ctr"/>
+              <a:r>
+                <a:rPr lang="en-US" sz="800" b="1" dirty="0"/>
+                <a:t>t</a:t>
+              </a:r>
+              <a:r>
+                <a:rPr lang="en-US" sz="800" b="1" dirty="0" smtClean="0"/>
+                <a:t>emporary </a:t>
+              </a:r>
+              <a:r>
+                <a:rPr lang="en-US" sz="800" b="1" smtClean="0"/>
+                <a:t>security </a:t>
+              </a:r>
+              <a:r>
+                <a:rPr lang="en-US" sz="800" b="1" smtClean="0"/>
+                <a:t>credential</a:t>
+              </a:r>
+            </a:p>
+            <a:p>
+              <a:pPr algn="ctr"/>
+              <a:r>
+                <a:rPr lang="en-US" sz="800" b="1" smtClean="0"/>
+                <a:t>of "src-role"</a:t>
+              </a:r>
+              <a:endParaRPr lang="en-US" sz="1400" b="1" dirty="0"/>
+            </a:p>
+          </p:txBody>
+        </p:sp>
+      </p:grpSp>
+      <p:pic>
+        <p:nvPicPr>
+          <p:cNvPr id="58" name="Picture 131"/>
+          <p:cNvPicPr>
+            <a:picLocks noChangeAspect="1"/>
+          </p:cNvPicPr>
+          <p:nvPr/>
+        </p:nvPicPr>
+        <p:blipFill>
+          <a:blip r:embed="rId8" cstate="print">
+            <a:extLst>
+              <a:ext uri="{28A0092B-C50C-407E-A947-70E740481C1C}">
+                <a14:useLocalDpi xmlns="" xmlns:a14="http://schemas.microsoft.com/office/drawing/2010/main" val="0"/>
+              </a:ext>
+            </a:extLst>
+          </a:blip>
+          <a:stretch>
+            <a:fillRect/>
+          </a:stretch>
+        </p:blipFill>
+        <p:spPr>
+          <a:xfrm>
+            <a:off x="2051720" y="4869160"/>
+            <a:ext cx="292242" cy="303067"/>
+          </a:xfrm>
+          <a:prstGeom prst="rect">
+            <a:avLst/>
+          </a:prstGeom>
+        </p:spPr>
+      </p:pic>
+      <p:cxnSp>
+        <p:nvCxnSpPr>
+          <p:cNvPr id="78" name="直線コネクタ 77"/>
+          <p:cNvCxnSpPr>
+            <a:stCxn id="58" idx="2"/>
+            <a:endCxn id="48" idx="0"/>
+          </p:cNvCxnSpPr>
+          <p:nvPr/>
+        </p:nvCxnSpPr>
+        <p:spPr>
+          <a:xfrm flipH="1">
+            <a:off x="2195736" y="5172227"/>
+            <a:ext cx="2105" cy="345005"/>
+          </a:xfrm>
+          <a:prstGeom prst="line">
+            <a:avLst/>
+          </a:prstGeom>
+        </p:spPr>
+        <p:style>
+          <a:lnRef idx="2">
+            <a:schemeClr val="accent3"/>
+          </a:lnRef>
+          <a:fillRef idx="0">
+            <a:schemeClr val="accent3"/>
+          </a:fillRef>
+          <a:effectRef idx="1">
+            <a:schemeClr val="accent3"/>
+          </a:effectRef>
+          <a:fontRef idx="minor">
+            <a:schemeClr val="tx1"/>
+          </a:fontRef>
+        </p:style>
+      </p:cxnSp>
+      <p:sp>
+        <p:nvSpPr>
+          <p:cNvPr id="57" name="TextBox 130"/>
+          <p:cNvSpPr txBox="1"/>
+          <p:nvPr/>
+        </p:nvSpPr>
+        <p:spPr>
+          <a:xfrm>
+            <a:off x="1983921" y="5195587"/>
+            <a:ext cx="432048" cy="249637"/>
+          </a:xfrm>
+          <a:prstGeom prst="rect">
+            <a:avLst/>
+          </a:prstGeom>
+          <a:noFill/>
+        </p:spPr>
+        <p:txBody>
+          <a:bodyPr wrap="square" lIns="0" tIns="0" rIns="0" bIns="0" rtlCol="0" anchor="t">
+            <a:noAutofit/>
+          </a:bodyPr>
+          <a:lstStyle/>
+          <a:p>
+            <a:pPr algn="ctr"/>
+            <a:r>
+              <a:rPr lang="en-US" sz="800" b="1" smtClean="0"/>
+              <a:t>EC2 instance</a:t>
+            </a:r>
+            <a:endParaRPr lang="en-US" sz="1400" b="1" dirty="0"/>
+          </a:p>
+        </p:txBody>
+      </p:sp>
+      <p:sp>
+        <p:nvSpPr>
+          <p:cNvPr id="81" name="右矢印 80"/>
+          <p:cNvSpPr/>
+          <p:nvPr/>
+        </p:nvSpPr>
+        <p:spPr>
+          <a:xfrm>
+            <a:off x="2411760" y="4869160"/>
+            <a:ext cx="432048" cy="288032"/>
+          </a:xfrm>
+          <a:prstGeom prst="rightArrow">
+            <a:avLst/>
+          </a:prstGeom>
+        </p:spPr>
+        <p:style>
+          <a:lnRef idx="1">
+            <a:schemeClr val="accent1"/>
+          </a:lnRef>
+          <a:fillRef idx="2">
+            <a:schemeClr val="accent1"/>
+          </a:fillRef>
+          <a:effectRef idx="1">
+            <a:schemeClr val="accent1"/>
+          </a:effectRef>
+          <a:fontRef idx="minor">
+            <a:schemeClr val="dk1"/>
+          </a:fontRef>
+        </p:style>
+        <p:txBody>
+          <a:bodyPr rtlCol="0" anchor="ctr"/>
+          <a:lstStyle/>
+          <a:p>
+            <a:pPr algn="ctr"/>
+            <a:endParaRPr kumimoji="1" lang="ja-JP" altLang="en-US"/>
+          </a:p>
+        </p:txBody>
+      </p:sp>
+      <p:sp>
+        <p:nvSpPr>
+          <p:cNvPr id="83" name="テキスト ボックス 82"/>
+          <p:cNvSpPr txBox="1"/>
+          <p:nvPr/>
+        </p:nvSpPr>
+        <p:spPr>
+          <a:xfrm>
+            <a:off x="1403648" y="4509120"/>
+            <a:ext cx="1368152" cy="534368"/>
+          </a:xfrm>
+          <a:prstGeom prst="rect">
+            <a:avLst/>
+          </a:prstGeom>
+          <a:solidFill>
+            <a:schemeClr val="bg1">
+              <a:alpha val="50000"/>
+            </a:schemeClr>
+          </a:solidFill>
+          <a:ln>
+            <a:solidFill>
+              <a:schemeClr val="tx1"/>
+            </a:solidFill>
+          </a:ln>
+        </p:spPr>
+        <p:txBody>
+          <a:bodyPr wrap="square" lIns="36000" tIns="36000" rIns="36000" bIns="36000" rtlCol="0">
+            <a:spAutoFit/>
+          </a:bodyPr>
+          <a:lstStyle/>
+          <a:p>
+            <a:r>
+              <a:rPr kumimoji="1" lang="en-US" altLang="ja-JP" sz="1000" smtClean="0"/>
+              <a:t>1. </a:t>
+            </a:r>
+            <a:r>
+              <a:rPr kumimoji="1" lang="en-US" altLang="ja-JP" sz="1000" smtClean="0"/>
+              <a:t>Retrieve temporary credentials within the EC2 instance.</a:t>
+            </a:r>
+            <a:endParaRPr kumimoji="1" lang="ja-JP" altLang="en-US" sz="1000"/>
           </a:p>
         </p:txBody>
       </p:sp>

</xml_diff>